<commit_message>
powerpoint - old slides
</commit_message>
<xml_diff>
--- a/assets/powerpoint/eatUP Powerpoint.pptx
+++ b/assets/powerpoint/eatUP Powerpoint.pptx
@@ -12,12 +12,10 @@
     <p:sldId id="261" r:id="rId6"/>
     <p:sldId id="262" r:id="rId7"/>
     <p:sldId id="269" r:id="rId8"/>
-    <p:sldId id="263" r:id="rId9"/>
+    <p:sldId id="270" r:id="rId9"/>
     <p:sldId id="264" r:id="rId10"/>
-    <p:sldId id="268" r:id="rId11"/>
-    <p:sldId id="265" r:id="rId12"/>
-    <p:sldId id="266" r:id="rId13"/>
-    <p:sldId id="267" r:id="rId14"/>
+    <p:sldId id="263" r:id="rId11"/>
+    <p:sldId id="267" r:id="rId12"/>
   </p:sldIdLst>
   <p:sldSz cx="12192000" cy="6858000"/>
   <p:notesSz cx="6858000" cy="9144000"/>
@@ -116,6 +114,11 @@
       </a:defRPr>
     </a:lvl9pPr>
   </p:defaultTextStyle>
+  <p:extLst>
+    <p:ext uri="{EFAFB233-063F-42B5-8137-9DF3F51BA10A}">
+      <p15:sldGuideLst xmlns:p15="http://schemas.microsoft.com/office/powerpoint/2012/main"/>
+    </p:ext>
+  </p:extLst>
 </p:presentation>
 </file>
 
@@ -8660,10 +8663,10 @@
       </p:grpSpPr>
       <p:sp>
         <p:nvSpPr>
-          <p:cNvPr id="8" name="Rectangle 7">
+          <p:cNvPr id="17" name="Rectangle 16">
             <a:extLst>
               <a:ext uri="{FF2B5EF4-FFF2-40B4-BE49-F238E27FC236}">
-                <a16:creationId xmlns:a16="http://schemas.microsoft.com/office/drawing/2014/main" id="{B66F8A2C-B8CF-4B20-9A73-2ADCF6302755}"/>
+                <a16:creationId xmlns:a16="http://schemas.microsoft.com/office/drawing/2014/main" id="{2DC4AA0A-D9C3-4A0B-990D-1BCB0022A696}"/>
               </a:ext>
               <a:ext uri="{C183D7F6-B498-43B3-948B-1728B52AA6E4}">
                 <adec:decorative xmlns:adec="http://schemas.microsoft.com/office/drawing/2017/decorative" val="1"/>
@@ -8683,16 +8686,14 @@
         </p:nvSpPr>
         <p:spPr>
           <a:xfrm>
-            <a:off x="0" y="0"/>
-            <a:ext cx="12192001" cy="6858000"/>
+            <a:off x="-1867" y="0"/>
+            <a:ext cx="12193867" cy="6858000"/>
           </a:xfrm>
           <a:prstGeom prst="rect">
             <a:avLst/>
           </a:prstGeom>
           <a:solidFill>
-            <a:schemeClr val="tx1">
-              <a:lumMod val="85000"/>
-            </a:schemeClr>
+            <a:srgbClr val="FFFFFF"/>
           </a:solidFill>
           <a:ln>
             <a:noFill/>
@@ -8715,119 +8716,49 @@
           </a:fontRef>
         </p:style>
         <p:txBody>
-          <a:bodyPr rot="0" spcFirstLastPara="0" vert="horz" wrap="square" lIns="91440" tIns="45720" rIns="91440" bIns="45720" numCol="1" spcCol="0" rtlCol="0" fromWordArt="0" anchor="ctr" anchorCtr="0" forceAA="0" compatLnSpc="1">
-            <a:prstTxWarp prst="textNoShape">
-              <a:avLst/>
-            </a:prstTxWarp>
-            <a:noAutofit/>
-          </a:bodyPr>
-          <a:lstStyle>
-            <a:defPPr>
-              <a:defRPr lang="en-US"/>
-            </a:defPPr>
-            <a:lvl1pPr marL="0" algn="l" defTabSz="914400" rtl="0" eaLnBrk="1" latinLnBrk="0" hangingPunct="1">
-              <a:defRPr sz="1800" kern="1200">
-                <a:solidFill>
-                  <a:schemeClr val="lt1"/>
-                </a:solidFill>
-                <a:latin typeface="+mn-lt"/>
-                <a:ea typeface="+mn-ea"/>
-                <a:cs typeface="+mn-cs"/>
-              </a:defRPr>
-            </a:lvl1pPr>
-            <a:lvl2pPr marL="457200" algn="l" defTabSz="914400" rtl="0" eaLnBrk="1" latinLnBrk="0" hangingPunct="1">
-              <a:defRPr sz="1800" kern="1200">
-                <a:solidFill>
-                  <a:schemeClr val="lt1"/>
-                </a:solidFill>
-                <a:latin typeface="+mn-lt"/>
-                <a:ea typeface="+mn-ea"/>
-                <a:cs typeface="+mn-cs"/>
-              </a:defRPr>
-            </a:lvl2pPr>
-            <a:lvl3pPr marL="914400" algn="l" defTabSz="914400" rtl="0" eaLnBrk="1" latinLnBrk="0" hangingPunct="1">
-              <a:defRPr sz="1800" kern="1200">
-                <a:solidFill>
-                  <a:schemeClr val="lt1"/>
-                </a:solidFill>
-                <a:latin typeface="+mn-lt"/>
-                <a:ea typeface="+mn-ea"/>
-                <a:cs typeface="+mn-cs"/>
-              </a:defRPr>
-            </a:lvl3pPr>
-            <a:lvl4pPr marL="1371600" algn="l" defTabSz="914400" rtl="0" eaLnBrk="1" latinLnBrk="0" hangingPunct="1">
-              <a:defRPr sz="1800" kern="1200">
-                <a:solidFill>
-                  <a:schemeClr val="lt1"/>
-                </a:solidFill>
-                <a:latin typeface="+mn-lt"/>
-                <a:ea typeface="+mn-ea"/>
-                <a:cs typeface="+mn-cs"/>
-              </a:defRPr>
-            </a:lvl4pPr>
-            <a:lvl5pPr marL="1828800" algn="l" defTabSz="914400" rtl="0" eaLnBrk="1" latinLnBrk="0" hangingPunct="1">
-              <a:defRPr sz="1800" kern="1200">
-                <a:solidFill>
-                  <a:schemeClr val="lt1"/>
-                </a:solidFill>
-                <a:latin typeface="+mn-lt"/>
-                <a:ea typeface="+mn-ea"/>
-                <a:cs typeface="+mn-cs"/>
-              </a:defRPr>
-            </a:lvl5pPr>
-            <a:lvl6pPr marL="2286000" algn="l" defTabSz="914400" rtl="0" eaLnBrk="1" latinLnBrk="0" hangingPunct="1">
-              <a:defRPr sz="1800" kern="1200">
-                <a:solidFill>
-                  <a:schemeClr val="lt1"/>
-                </a:solidFill>
-                <a:latin typeface="+mn-lt"/>
-                <a:ea typeface="+mn-ea"/>
-                <a:cs typeface="+mn-cs"/>
-              </a:defRPr>
-            </a:lvl6pPr>
-            <a:lvl7pPr marL="2743200" algn="l" defTabSz="914400" rtl="0" eaLnBrk="1" latinLnBrk="0" hangingPunct="1">
-              <a:defRPr sz="1800" kern="1200">
-                <a:solidFill>
-                  <a:schemeClr val="lt1"/>
-                </a:solidFill>
-                <a:latin typeface="+mn-lt"/>
-                <a:ea typeface="+mn-ea"/>
-                <a:cs typeface="+mn-cs"/>
-              </a:defRPr>
-            </a:lvl7pPr>
-            <a:lvl8pPr marL="3200400" algn="l" defTabSz="914400" rtl="0" eaLnBrk="1" latinLnBrk="0" hangingPunct="1">
-              <a:defRPr sz="1800" kern="1200">
-                <a:solidFill>
-                  <a:schemeClr val="lt1"/>
-                </a:solidFill>
-                <a:latin typeface="+mn-lt"/>
-                <a:ea typeface="+mn-ea"/>
-                <a:cs typeface="+mn-cs"/>
-              </a:defRPr>
-            </a:lvl8pPr>
-            <a:lvl9pPr marL="3657600" algn="l" defTabSz="914400" rtl="0" eaLnBrk="1" latinLnBrk="0" hangingPunct="1">
-              <a:defRPr sz="1800" kern="1200">
-                <a:solidFill>
-                  <a:schemeClr val="lt1"/>
-                </a:solidFill>
-                <a:latin typeface="+mn-lt"/>
-                <a:ea typeface="+mn-ea"/>
-                <a:cs typeface="+mn-cs"/>
-              </a:defRPr>
-            </a:lvl9pPr>
-          </a:lstStyle>
+          <a:bodyPr rtlCol="0" anchor="ctr"/>
+          <a:lstStyle/>
           <a:p>
             <a:pPr algn="ctr"/>
-            <a:endParaRPr lang="en-US"/>
+            <a:endParaRPr lang="en-US" dirty="0"/>
           </a:p>
         </p:txBody>
       </p:sp>
+      <p:pic>
+        <p:nvPicPr>
+          <p:cNvPr id="12" name="Picture 11">
+            <a:extLst>
+              <a:ext uri="{FF2B5EF4-FFF2-40B4-BE49-F238E27FC236}">
+                <a16:creationId xmlns:a16="http://schemas.microsoft.com/office/drawing/2014/main" id="{8FAD867A-2549-4058-B44A-32D0A3F37BE1}"/>
+              </a:ext>
+            </a:extLst>
+          </p:cNvPr>
+          <p:cNvPicPr>
+            <a:picLocks noChangeAspect="1"/>
+          </p:cNvPicPr>
+          <p:nvPr/>
+        </p:nvPicPr>
+        <p:blipFill rotWithShape="1">
+          <a:blip r:embed="rId2"/>
+          <a:srcRect t="2589"/>
+          <a:stretch/>
+        </p:blipFill>
+        <p:spPr>
+          <a:xfrm>
+            <a:off x="2696486" y="731520"/>
+            <a:ext cx="6773332" cy="3134044"/>
+          </a:xfrm>
+          <a:prstGeom prst="rect">
+            <a:avLst/>
+          </a:prstGeom>
+        </p:spPr>
+      </p:pic>
       <p:sp>
         <p:nvSpPr>
-          <p:cNvPr id="10" name="Rectangle 9">
+          <p:cNvPr id="19" name="Rectangle 18">
             <a:extLst>
               <a:ext uri="{FF2B5EF4-FFF2-40B4-BE49-F238E27FC236}">
-                <a16:creationId xmlns:a16="http://schemas.microsoft.com/office/drawing/2014/main" id="{B5DD78E9-DE0D-47AF-A0DB-F475221E3DC7}"/>
+                <a16:creationId xmlns:a16="http://schemas.microsoft.com/office/drawing/2014/main" id="{370878C7-7719-40BD-AA97-751A85670594}"/>
               </a:ext>
               <a:ext uri="{C183D7F6-B498-43B3-948B-1728B52AA6E4}">
                 <adec:decorative xmlns:adec="http://schemas.microsoft.com/office/drawing/2017/decorative" val="1"/>
@@ -8847,14 +8778,14 @@
         </p:nvSpPr>
         <p:spPr>
           <a:xfrm>
-            <a:off x="632108" y="610955"/>
-            <a:ext cx="10927784" cy="5636090"/>
+            <a:off x="630501" y="4212709"/>
+            <a:ext cx="10905302" cy="1997060"/>
           </a:xfrm>
           <a:prstGeom prst="rect">
             <a:avLst/>
           </a:prstGeom>
           <a:solidFill>
-            <a:srgbClr val="FFFFFF"/>
+            <a:srgbClr val="434F5A"/>
           </a:solidFill>
           <a:ln w="6350" cap="flat" cmpd="sng" algn="ctr">
             <a:noFill/>
@@ -8872,10 +8803,10 @@
       </p:sp>
       <p:sp>
         <p:nvSpPr>
-          <p:cNvPr id="12" name="Rectangle 11">
+          <p:cNvPr id="21" name="Rectangle 20">
             <a:extLst>
               <a:ext uri="{FF2B5EF4-FFF2-40B4-BE49-F238E27FC236}">
-                <a16:creationId xmlns:a16="http://schemas.microsoft.com/office/drawing/2014/main" id="{A118D329-2010-4A15-B57C-429FFAE35B11}"/>
+                <a16:creationId xmlns:a16="http://schemas.microsoft.com/office/drawing/2014/main" id="{1D9D3865-C494-4C4A-8495-8245E905469D}"/>
               </a:ext>
               <a:ext uri="{C183D7F6-B498-43B3-948B-1728B52AA6E4}">
                 <adec:decorative xmlns:adec="http://schemas.microsoft.com/office/drawing/2017/decorative" val="1"/>
@@ -8895,18 +8826,13 @@
         </p:nvSpPr>
         <p:spPr>
           <a:xfrm>
-            <a:off x="797052" y="777240"/>
-            <a:ext cx="10597896" cy="5303520"/>
+            <a:off x="793348" y="4379135"/>
+            <a:ext cx="10579608" cy="1664208"/>
           </a:xfrm>
           <a:prstGeom prst="rect">
             <a:avLst/>
           </a:prstGeom>
-          <a:solidFill>
-            <a:schemeClr val="bg1">
-              <a:lumMod val="85000"/>
-              <a:lumOff val="15000"/>
-            </a:schemeClr>
-          </a:solidFill>
+          <a:noFill/>
           <a:ln w="6350" cap="sq" cmpd="sng" algn="ctr">
             <a:solidFill>
               <a:schemeClr val="tx1"/>
@@ -8922,7 +8848,7 @@
           <p:cNvPr id="2" name="Title 1">
             <a:extLst>
               <a:ext uri="{FF2B5EF4-FFF2-40B4-BE49-F238E27FC236}">
-                <a16:creationId xmlns:a16="http://schemas.microsoft.com/office/drawing/2014/main" id="{92ADFA8B-25C6-4292-93BC-BB9BAFB0860A}"/>
+                <a16:creationId xmlns:a16="http://schemas.microsoft.com/office/drawing/2014/main" id="{D25339D6-7735-479B-A027-73FEB020D80F}"/>
               </a:ext>
             </a:extLst>
           </p:cNvPr>
@@ -8930,23 +8856,38 @@
             <a:spLocks noGrp="1"/>
           </p:cNvSpPr>
           <p:nvPr>
-            <p:ph type="ctrTitle"/>
+            <p:ph type="title"/>
           </p:nvPr>
         </p:nvSpPr>
         <p:spPr>
           <a:xfrm>
-            <a:off x="1263520" y="1272800"/>
-            <a:ext cx="6544620" cy="4312402"/>
+            <a:off x="956234" y="4495894"/>
+            <a:ext cx="4942542" cy="1371600"/>
           </a:xfrm>
         </p:spPr>
         <p:txBody>
-          <a:bodyPr anchor="ctr">
+          <a:bodyPr>
             <a:normAutofit/>
           </a:bodyPr>
           <a:lstStyle/>
           <a:p>
             <a:pPr algn="r"/>
-            <a:endParaRPr lang="en-AU">
+            <a:r>
+              <a:rPr lang="en-AU" sz="3100" dirty="0">
+                <a:solidFill>
+                  <a:schemeClr val="tx1"/>
+                </a:solidFill>
+              </a:rPr>
+              <a:t>DEMO OF APP’S FUNCTIONS</a:t>
+            </a:r>
+            <a:br>
+              <a:rPr lang="en-AU" sz="3100" dirty="0">
+                <a:solidFill>
+                  <a:schemeClr val="tx1"/>
+                </a:solidFill>
+              </a:rPr>
+            </a:br>
+            <a:endParaRPr lang="en-AU" sz="3100" dirty="0">
               <a:solidFill>
                 <a:schemeClr val="tx1"/>
               </a:solidFill>
@@ -8954,45 +8895,12 @@
           </a:p>
         </p:txBody>
       </p:sp>
-      <p:sp>
-        <p:nvSpPr>
-          <p:cNvPr id="3" name="Subtitle 2">
+      <p:cxnSp>
+        <p:nvCxnSpPr>
+          <p:cNvPr id="23" name="Straight Connector 22">
             <a:extLst>
               <a:ext uri="{FF2B5EF4-FFF2-40B4-BE49-F238E27FC236}">
-                <a16:creationId xmlns:a16="http://schemas.microsoft.com/office/drawing/2014/main" id="{C9B57A9B-43AF-4100-A6F0-248AFDE0208B}"/>
-              </a:ext>
-            </a:extLst>
-          </p:cNvPr>
-          <p:cNvSpPr>
-            <a:spLocks noGrp="1"/>
-          </p:cNvSpPr>
-          <p:nvPr>
-            <p:ph type="subTitle" idx="1"/>
-          </p:nvPr>
-        </p:nvSpPr>
-        <p:spPr>
-          <a:xfrm>
-            <a:off x="8473440" y="1272800"/>
-            <a:ext cx="2481307" cy="4312402"/>
-          </a:xfrm>
-        </p:spPr>
-        <p:txBody>
-          <a:bodyPr anchor="ctr">
-            <a:normAutofit/>
-          </a:bodyPr>
-          <a:lstStyle/>
-          <a:p>
-            <a:pPr algn="l"/>
-            <a:endParaRPr lang="en-AU" sz="2000"/>
-          </a:p>
-        </p:txBody>
-      </p:sp>
-      <p:cxnSp>
-        <p:nvCxnSpPr>
-          <p:cNvPr id="14" name="Straight Connector 13">
-            <a:extLst>
-              <a:ext uri="{FF2B5EF4-FFF2-40B4-BE49-F238E27FC236}">
-                <a16:creationId xmlns:a16="http://schemas.microsoft.com/office/drawing/2014/main" id="{994262BC-EE98-4BD6-82DB-4955E8DCC290}"/>
+                <a16:creationId xmlns:a16="http://schemas.microsoft.com/office/drawing/2014/main" id="{B78EE79F-FCAA-4CF9-9746-730B51FC4CB3}"/>
               </a:ext>
               <a:ext uri="{C183D7F6-B498-43B3-948B-1728B52AA6E4}">
                 <adec:decorative xmlns:adec="http://schemas.microsoft.com/office/drawing/2017/decorative" val="1"/>
@@ -9012,18 +8920,15 @@
         </p:nvCxnSpPr>
         <p:spPr>
           <a:xfrm>
-            <a:off x="8129872" y="2057401"/>
-            <a:ext cx="0" cy="2743200"/>
+            <a:off x="6096000" y="4634895"/>
+            <a:ext cx="0" cy="1152689"/>
           </a:xfrm>
           <a:prstGeom prst="line">
             <a:avLst/>
           </a:prstGeom>
-          <a:ln w="12700">
+          <a:ln>
             <a:solidFill>
-              <a:schemeClr val="tx1">
-                <a:lumMod val="75000"/>
-                <a:lumOff val="25000"/>
-              </a:schemeClr>
+              <a:schemeClr val="tx1"/>
             </a:solidFill>
           </a:ln>
         </p:spPr>
@@ -9042,10 +8947,60 @@
           </a:fontRef>
         </p:style>
       </p:cxnSp>
+      <p:sp>
+        <p:nvSpPr>
+          <p:cNvPr id="3" name="Content Placeholder 2">
+            <a:extLst>
+              <a:ext uri="{FF2B5EF4-FFF2-40B4-BE49-F238E27FC236}">
+                <a16:creationId xmlns:a16="http://schemas.microsoft.com/office/drawing/2014/main" id="{B252B49F-43AA-4A63-89E6-478A159E8EC5}"/>
+              </a:ext>
+            </a:extLst>
+          </p:cNvPr>
+          <p:cNvSpPr>
+            <a:spLocks noGrp="1"/>
+          </p:cNvSpPr>
+          <p:nvPr>
+            <p:ph idx="1"/>
+          </p:nvPr>
+        </p:nvSpPr>
+        <p:spPr>
+          <a:xfrm>
+            <a:off x="6256866" y="4787922"/>
+            <a:ext cx="4978899" cy="1152690"/>
+          </a:xfrm>
+        </p:spPr>
+        <p:txBody>
+          <a:bodyPr anchor="ctr">
+            <a:normAutofit fontScale="92500" lnSpcReduction="20000"/>
+          </a:bodyPr>
+          <a:lstStyle/>
+          <a:p>
+            <a:r>
+              <a:rPr lang="en-AU" sz="2800" u="sng" dirty="0">
+                <a:latin typeface="+mj-lt"/>
+                <a:hlinkClick r:id="rId3">
+                  <a:extLst>
+                    <a:ext uri="{A12FA001-AC4F-418D-AE19-62706E023703}">
+                      <ahyp:hlinkClr xmlns:ahyp="http://schemas.microsoft.com/office/drawing/2018/hyperlinkcolor" val="tx"/>
+                    </a:ext>
+                  </a:extLst>
+                </a:hlinkClick>
+              </a:rPr>
+              <a:t>https://daniel-brewer-stephenson.github.io/project1/</a:t>
+            </a:r>
+            <a:endParaRPr lang="en-AU" sz="2800" u="sng" dirty="0">
+              <a:latin typeface="+mj-lt"/>
+            </a:endParaRPr>
+          </a:p>
+          <a:p>
+            <a:endParaRPr lang="en-AU" dirty="0"/>
+          </a:p>
+        </p:txBody>
+      </p:sp>
     </p:spTree>
     <p:extLst>
       <p:ext uri="{BB962C8B-B14F-4D97-AF65-F5344CB8AC3E}">
-        <p14:creationId xmlns:p14="http://schemas.microsoft.com/office/powerpoint/2010/main" val="427812708"/>
+        <p14:creationId xmlns:p14="http://schemas.microsoft.com/office/powerpoint/2010/main" val="2917685803"/>
       </p:ext>
     </p:extLst>
   </p:cSld>
@@ -9312,12 +9267,8 @@
           <a:p>
             <a:r>
               <a:rPr lang="en-AU" dirty="0"/>
-              <a:t>SPARE PAGE</a:t>
+              <a:t>Any Questions?</a:t>
             </a:r>
-            <a:br>
-              <a:rPr lang="en-AU" dirty="0"/>
-            </a:br>
-            <a:endParaRPr lang="en-AU" dirty="0"/>
           </a:p>
         </p:txBody>
       </p:sp>
@@ -9349,629 +9300,22 @@
           </a:bodyPr>
           <a:lstStyle/>
           <a:p>
-            <a:endParaRPr lang="en-AU"/>
-          </a:p>
-        </p:txBody>
-      </p:sp>
-    </p:spTree>
-    <p:extLst>
-      <p:ext uri="{BB962C8B-B14F-4D97-AF65-F5344CB8AC3E}">
-        <p14:creationId xmlns:p14="http://schemas.microsoft.com/office/powerpoint/2010/main" val="1401642146"/>
-      </p:ext>
-    </p:extLst>
-  </p:cSld>
-  <p:clrMapOvr>
-    <a:masterClrMapping/>
-  </p:clrMapOvr>
-</p:sld>
-</file>
-
-<file path=ppt/slides/slide12.xml><?xml version="1.0" encoding="utf-8"?>
-<p:sld xmlns:a="http://schemas.openxmlformats.org/drawingml/2006/main" xmlns:r="http://schemas.openxmlformats.org/officeDocument/2006/relationships" xmlns:p="http://schemas.openxmlformats.org/presentationml/2006/main">
-  <p:cSld>
-    <p:bg>
-      <p:bgPr>
-        <a:solidFill>
-          <a:schemeClr val="bg1"/>
-        </a:solidFill>
-        <a:effectLst/>
-      </p:bgPr>
-    </p:bg>
-    <p:spTree>
-      <p:nvGrpSpPr>
-        <p:cNvPr id="1" name=""/>
-        <p:cNvGrpSpPr/>
-        <p:nvPr/>
-      </p:nvGrpSpPr>
-      <p:grpSpPr>
-        <a:xfrm>
-          <a:off x="0" y="0"/>
-          <a:ext cx="0" cy="0"/>
-          <a:chOff x="0" y="0"/>
-          <a:chExt cx="0" cy="0"/>
-        </a:xfrm>
-      </p:grpSpPr>
-      <p:sp>
-        <p:nvSpPr>
-          <p:cNvPr id="8" name="Rectangle 7">
-            <a:extLst>
-              <a:ext uri="{FF2B5EF4-FFF2-40B4-BE49-F238E27FC236}">
-                <a16:creationId xmlns:a16="http://schemas.microsoft.com/office/drawing/2014/main" id="{70120F84-A866-4D9F-8B1C-9120A013D654}"/>
-              </a:ext>
-              <a:ext uri="{C183D7F6-B498-43B3-948B-1728B52AA6E4}">
-                <adec:decorative xmlns:adec="http://schemas.microsoft.com/office/drawing/2017/decorative" val="1"/>
-              </a:ext>
-            </a:extLst>
-          </p:cNvPr>
-          <p:cNvSpPr>
-            <a:spLocks noGrp="1" noRot="1" noChangeAspect="1" noMove="1" noResize="1" noEditPoints="1" noAdjustHandles="1" noChangeArrowheads="1" noChangeShapeType="1" noTextEdit="1"/>
-          </p:cNvSpPr>
-          <p:nvPr>
-            <p:extLst>
-              <p:ext uri="{386F3935-93C4-4BCD-93E2-E3B085C9AB24}">
-                <p16:designElem xmlns:p16="http://schemas.microsoft.com/office/powerpoint/2015/main" val="1"/>
-              </p:ext>
-            </p:extLst>
-          </p:nvPr>
-        </p:nvSpPr>
-        <p:spPr>
-          <a:xfrm>
-            <a:off x="0" y="0"/>
-            <a:ext cx="12192001" cy="6858000"/>
-          </a:xfrm>
-          <a:prstGeom prst="rect">
-            <a:avLst/>
-          </a:prstGeom>
-          <a:solidFill>
-            <a:schemeClr val="accent1"/>
-          </a:solidFill>
-          <a:ln>
-            <a:noFill/>
-          </a:ln>
-        </p:spPr>
-        <p:style>
-          <a:lnRef idx="2">
-            <a:schemeClr val="accent1">
-              <a:shade val="50000"/>
-            </a:schemeClr>
-          </a:lnRef>
-          <a:fillRef idx="1">
-            <a:schemeClr val="accent1"/>
-          </a:fillRef>
-          <a:effectRef idx="0">
-            <a:schemeClr val="accent1"/>
-          </a:effectRef>
-          <a:fontRef idx="minor">
-            <a:schemeClr val="lt1"/>
-          </a:fontRef>
-        </p:style>
-        <p:txBody>
-          <a:bodyPr rot="0" spcFirstLastPara="0" vert="horz" wrap="square" lIns="91440" tIns="45720" rIns="91440" bIns="45720" numCol="1" spcCol="0" rtlCol="0" fromWordArt="0" anchor="ctr" anchorCtr="0" forceAA="0" compatLnSpc="1">
-            <a:prstTxWarp prst="textNoShape">
-              <a:avLst/>
-            </a:prstTxWarp>
-            <a:noAutofit/>
-          </a:bodyPr>
-          <a:lstStyle>
-            <a:defPPr>
-              <a:defRPr lang="en-US"/>
-            </a:defPPr>
-            <a:lvl1pPr marL="0" algn="l" defTabSz="914400" rtl="0" eaLnBrk="1" latinLnBrk="0" hangingPunct="1">
-              <a:defRPr sz="1800" kern="1200">
-                <a:solidFill>
-                  <a:schemeClr val="lt1"/>
-                </a:solidFill>
-                <a:latin typeface="+mn-lt"/>
-                <a:ea typeface="+mn-ea"/>
-                <a:cs typeface="+mn-cs"/>
-              </a:defRPr>
-            </a:lvl1pPr>
-            <a:lvl2pPr marL="457200" algn="l" defTabSz="914400" rtl="0" eaLnBrk="1" latinLnBrk="0" hangingPunct="1">
-              <a:defRPr sz="1800" kern="1200">
-                <a:solidFill>
-                  <a:schemeClr val="lt1"/>
-                </a:solidFill>
-                <a:latin typeface="+mn-lt"/>
-                <a:ea typeface="+mn-ea"/>
-                <a:cs typeface="+mn-cs"/>
-              </a:defRPr>
-            </a:lvl2pPr>
-            <a:lvl3pPr marL="914400" algn="l" defTabSz="914400" rtl="0" eaLnBrk="1" latinLnBrk="0" hangingPunct="1">
-              <a:defRPr sz="1800" kern="1200">
-                <a:solidFill>
-                  <a:schemeClr val="lt1"/>
-                </a:solidFill>
-                <a:latin typeface="+mn-lt"/>
-                <a:ea typeface="+mn-ea"/>
-                <a:cs typeface="+mn-cs"/>
-              </a:defRPr>
-            </a:lvl3pPr>
-            <a:lvl4pPr marL="1371600" algn="l" defTabSz="914400" rtl="0" eaLnBrk="1" latinLnBrk="0" hangingPunct="1">
-              <a:defRPr sz="1800" kern="1200">
-                <a:solidFill>
-                  <a:schemeClr val="lt1"/>
-                </a:solidFill>
-                <a:latin typeface="+mn-lt"/>
-                <a:ea typeface="+mn-ea"/>
-                <a:cs typeface="+mn-cs"/>
-              </a:defRPr>
-            </a:lvl4pPr>
-            <a:lvl5pPr marL="1828800" algn="l" defTabSz="914400" rtl="0" eaLnBrk="1" latinLnBrk="0" hangingPunct="1">
-              <a:defRPr sz="1800" kern="1200">
-                <a:solidFill>
-                  <a:schemeClr val="lt1"/>
-                </a:solidFill>
-                <a:latin typeface="+mn-lt"/>
-                <a:ea typeface="+mn-ea"/>
-                <a:cs typeface="+mn-cs"/>
-              </a:defRPr>
-            </a:lvl5pPr>
-            <a:lvl6pPr marL="2286000" algn="l" defTabSz="914400" rtl="0" eaLnBrk="1" latinLnBrk="0" hangingPunct="1">
-              <a:defRPr sz="1800" kern="1200">
-                <a:solidFill>
-                  <a:schemeClr val="lt1"/>
-                </a:solidFill>
-                <a:latin typeface="+mn-lt"/>
-                <a:ea typeface="+mn-ea"/>
-                <a:cs typeface="+mn-cs"/>
-              </a:defRPr>
-            </a:lvl6pPr>
-            <a:lvl7pPr marL="2743200" algn="l" defTabSz="914400" rtl="0" eaLnBrk="1" latinLnBrk="0" hangingPunct="1">
-              <a:defRPr sz="1800" kern="1200">
-                <a:solidFill>
-                  <a:schemeClr val="lt1"/>
-                </a:solidFill>
-                <a:latin typeface="+mn-lt"/>
-                <a:ea typeface="+mn-ea"/>
-                <a:cs typeface="+mn-cs"/>
-              </a:defRPr>
-            </a:lvl7pPr>
-            <a:lvl8pPr marL="3200400" algn="l" defTabSz="914400" rtl="0" eaLnBrk="1" latinLnBrk="0" hangingPunct="1">
-              <a:defRPr sz="1800" kern="1200">
-                <a:solidFill>
-                  <a:schemeClr val="lt1"/>
-                </a:solidFill>
-                <a:latin typeface="+mn-lt"/>
-                <a:ea typeface="+mn-ea"/>
-                <a:cs typeface="+mn-cs"/>
-              </a:defRPr>
-            </a:lvl8pPr>
-            <a:lvl9pPr marL="3657600" algn="l" defTabSz="914400" rtl="0" eaLnBrk="1" latinLnBrk="0" hangingPunct="1">
-              <a:defRPr sz="1800" kern="1200">
-                <a:solidFill>
-                  <a:schemeClr val="lt1"/>
-                </a:solidFill>
-                <a:latin typeface="+mn-lt"/>
-                <a:ea typeface="+mn-ea"/>
-                <a:cs typeface="+mn-cs"/>
-              </a:defRPr>
-            </a:lvl9pPr>
-          </a:lstStyle>
-          <a:p>
-            <a:pPr algn="ctr"/>
-            <a:endParaRPr lang="en-US"/>
-          </a:p>
-        </p:txBody>
-      </p:sp>
-      <p:sp useBgFill="1">
-        <p:nvSpPr>
-          <p:cNvPr id="10" name="Rectangle 9">
-            <a:extLst>
-              <a:ext uri="{FF2B5EF4-FFF2-40B4-BE49-F238E27FC236}">
-                <a16:creationId xmlns:a16="http://schemas.microsoft.com/office/drawing/2014/main" id="{252FEFEF-6AC0-46B6-AC09-11FC56196FA4}"/>
-              </a:ext>
-              <a:ext uri="{C183D7F6-B498-43B3-948B-1728B52AA6E4}">
-                <adec:decorative xmlns:adec="http://schemas.microsoft.com/office/drawing/2017/decorative" val="1"/>
-              </a:ext>
-            </a:extLst>
-          </p:cNvPr>
-          <p:cNvSpPr>
-            <a:spLocks noGrp="1" noRot="1" noChangeAspect="1" noMove="1" noResize="1" noEditPoints="1" noAdjustHandles="1" noChangeArrowheads="1" noChangeShapeType="1" noTextEdit="1"/>
-          </p:cNvSpPr>
-          <p:nvPr>
-            <p:extLst>
-              <p:ext uri="{386F3935-93C4-4BCD-93E2-E3B085C9AB24}">
-                <p16:designElem xmlns:p16="http://schemas.microsoft.com/office/powerpoint/2015/main" val="1"/>
-              </p:ext>
-            </p:extLst>
-          </p:nvPr>
-        </p:nvSpPr>
-        <p:spPr>
-          <a:xfrm>
-            <a:off x="210312" y="226665"/>
-            <a:ext cx="11722608" cy="6382512"/>
-          </a:xfrm>
-          <a:prstGeom prst="rect">
-            <a:avLst/>
-          </a:prstGeom>
-          <a:ln w="6350" cap="flat" cmpd="sng" algn="ctr">
-            <a:noFill/>
-            <a:prstDash val="solid"/>
-          </a:ln>
-          <a:effectLst>
-            <a:softEdge rad="0"/>
-          </a:effectLst>
-        </p:spPr>
-      </p:sp>
-      <p:sp>
-        <p:nvSpPr>
-          <p:cNvPr id="2" name="Title 1">
-            <a:extLst>
-              <a:ext uri="{FF2B5EF4-FFF2-40B4-BE49-F238E27FC236}">
-                <a16:creationId xmlns:a16="http://schemas.microsoft.com/office/drawing/2014/main" id="{C475F94E-71D8-4CB0-9ACA-83C2E1DBFB2A}"/>
-              </a:ext>
-            </a:extLst>
-          </p:cNvPr>
-          <p:cNvSpPr>
-            <a:spLocks noGrp="1"/>
-          </p:cNvSpPr>
-          <p:nvPr>
-            <p:ph type="title"/>
-          </p:nvPr>
-        </p:nvSpPr>
-        <p:spPr>
-          <a:xfrm>
-            <a:off x="1175512" y="870132"/>
-            <a:ext cx="9792208" cy="1527078"/>
-          </a:xfrm>
-        </p:spPr>
-        <p:txBody>
-          <a:bodyPr>
-            <a:normAutofit/>
-          </a:bodyPr>
-          <a:lstStyle/>
-          <a:p>
             <a:r>
-              <a:rPr lang="en-AU" dirty="0"/>
-              <a:t>SPARE PAGE</a:t>
+              <a:rPr lang="en-AU" sz="2400" dirty="0">
+                <a:latin typeface="+mj-lt"/>
+              </a:rPr>
+              <a:t>Please ask after class, thx </a:t>
             </a:r>
-            <a:br>
-              <a:rPr lang="en-AU" dirty="0"/>
-            </a:br>
-            <a:endParaRPr lang="en-AU" dirty="0"/>
-          </a:p>
-        </p:txBody>
-      </p:sp>
-      <p:sp>
-        <p:nvSpPr>
-          <p:cNvPr id="3" name="Content Placeholder 2">
-            <a:extLst>
-              <a:ext uri="{FF2B5EF4-FFF2-40B4-BE49-F238E27FC236}">
-                <a16:creationId xmlns:a16="http://schemas.microsoft.com/office/drawing/2014/main" id="{271577FC-B92F-4A56-ADB5-499415970C46}"/>
-              </a:ext>
-            </a:extLst>
-          </p:cNvPr>
-          <p:cNvSpPr>
-            <a:spLocks noGrp="1"/>
-          </p:cNvSpPr>
-          <p:nvPr>
-            <p:ph idx="1"/>
-          </p:nvPr>
-        </p:nvSpPr>
-        <p:spPr>
-          <a:xfrm>
-            <a:off x="1175512" y="2557849"/>
-            <a:ext cx="9792208" cy="3407862"/>
-          </a:xfrm>
-        </p:spPr>
-        <p:txBody>
-          <a:bodyPr>
-            <a:normAutofit/>
-          </a:bodyPr>
-          <a:lstStyle/>
-          <a:p>
-            <a:endParaRPr lang="en-AU"/>
-          </a:p>
-        </p:txBody>
-      </p:sp>
-    </p:spTree>
-    <p:extLst>
-      <p:ext uri="{BB962C8B-B14F-4D97-AF65-F5344CB8AC3E}">
-        <p14:creationId xmlns:p14="http://schemas.microsoft.com/office/powerpoint/2010/main" val="1581688831"/>
-      </p:ext>
-    </p:extLst>
-  </p:cSld>
-  <p:clrMapOvr>
-    <a:masterClrMapping/>
-  </p:clrMapOvr>
-</p:sld>
-</file>
-
-<file path=ppt/slides/slide13.xml><?xml version="1.0" encoding="utf-8"?>
-<p:sld xmlns:a="http://schemas.openxmlformats.org/drawingml/2006/main" xmlns:r="http://schemas.openxmlformats.org/officeDocument/2006/relationships" xmlns:p="http://schemas.openxmlformats.org/presentationml/2006/main">
-  <p:cSld>
-    <p:bg>
-      <p:bgPr>
-        <a:solidFill>
-          <a:schemeClr val="bg1"/>
-        </a:solidFill>
-        <a:effectLst/>
-      </p:bgPr>
-    </p:bg>
-    <p:spTree>
-      <p:nvGrpSpPr>
-        <p:cNvPr id="1" name=""/>
-        <p:cNvGrpSpPr/>
-        <p:nvPr/>
-      </p:nvGrpSpPr>
-      <p:grpSpPr>
-        <a:xfrm>
-          <a:off x="0" y="0"/>
-          <a:ext cx="0" cy="0"/>
-          <a:chOff x="0" y="0"/>
-          <a:chExt cx="0" cy="0"/>
-        </a:xfrm>
-      </p:grpSpPr>
-      <p:sp>
-        <p:nvSpPr>
-          <p:cNvPr id="8" name="Rectangle 7">
-            <a:extLst>
-              <a:ext uri="{FF2B5EF4-FFF2-40B4-BE49-F238E27FC236}">
-                <a16:creationId xmlns:a16="http://schemas.microsoft.com/office/drawing/2014/main" id="{70120F84-A866-4D9F-8B1C-9120A013D654}"/>
-              </a:ext>
-              <a:ext uri="{C183D7F6-B498-43B3-948B-1728B52AA6E4}">
-                <adec:decorative xmlns:adec="http://schemas.microsoft.com/office/drawing/2017/decorative" val="1"/>
-              </a:ext>
-            </a:extLst>
-          </p:cNvPr>
-          <p:cNvSpPr>
-            <a:spLocks noGrp="1" noRot="1" noChangeAspect="1" noMove="1" noResize="1" noEditPoints="1" noAdjustHandles="1" noChangeArrowheads="1" noChangeShapeType="1" noTextEdit="1"/>
-          </p:cNvSpPr>
-          <p:nvPr>
-            <p:extLst>
-              <p:ext uri="{386F3935-93C4-4BCD-93E2-E3B085C9AB24}">
-                <p16:designElem xmlns:p16="http://schemas.microsoft.com/office/powerpoint/2015/main" val="1"/>
-              </p:ext>
-            </p:extLst>
-          </p:nvPr>
-        </p:nvSpPr>
-        <p:spPr>
-          <a:xfrm>
-            <a:off x="0" y="0"/>
-            <a:ext cx="12192001" cy="6858000"/>
-          </a:xfrm>
-          <a:prstGeom prst="rect">
-            <a:avLst/>
-          </a:prstGeom>
-          <a:solidFill>
-            <a:schemeClr val="accent1"/>
-          </a:solidFill>
-          <a:ln>
-            <a:noFill/>
-          </a:ln>
-        </p:spPr>
-        <p:style>
-          <a:lnRef idx="2">
-            <a:schemeClr val="accent1">
-              <a:shade val="50000"/>
-            </a:schemeClr>
-          </a:lnRef>
-          <a:fillRef idx="1">
-            <a:schemeClr val="accent1"/>
-          </a:fillRef>
-          <a:effectRef idx="0">
-            <a:schemeClr val="accent1"/>
-          </a:effectRef>
-          <a:fontRef idx="minor">
-            <a:schemeClr val="lt1"/>
-          </a:fontRef>
-        </p:style>
-        <p:txBody>
-          <a:bodyPr rot="0" spcFirstLastPara="0" vert="horz" wrap="square" lIns="91440" tIns="45720" rIns="91440" bIns="45720" numCol="1" spcCol="0" rtlCol="0" fromWordArt="0" anchor="ctr" anchorCtr="0" forceAA="0" compatLnSpc="1">
-            <a:prstTxWarp prst="textNoShape">
-              <a:avLst/>
-            </a:prstTxWarp>
-            <a:noAutofit/>
-          </a:bodyPr>
-          <a:lstStyle>
-            <a:defPPr>
-              <a:defRPr lang="en-US"/>
-            </a:defPPr>
-            <a:lvl1pPr marL="0" algn="l" defTabSz="914400" rtl="0" eaLnBrk="1" latinLnBrk="0" hangingPunct="1">
-              <a:defRPr sz="1800" kern="1200">
-                <a:solidFill>
-                  <a:schemeClr val="lt1"/>
-                </a:solidFill>
-                <a:latin typeface="+mn-lt"/>
-                <a:ea typeface="+mn-ea"/>
-                <a:cs typeface="+mn-cs"/>
-              </a:defRPr>
-            </a:lvl1pPr>
-            <a:lvl2pPr marL="457200" algn="l" defTabSz="914400" rtl="0" eaLnBrk="1" latinLnBrk="0" hangingPunct="1">
-              <a:defRPr sz="1800" kern="1200">
-                <a:solidFill>
-                  <a:schemeClr val="lt1"/>
-                </a:solidFill>
-                <a:latin typeface="+mn-lt"/>
-                <a:ea typeface="+mn-ea"/>
-                <a:cs typeface="+mn-cs"/>
-              </a:defRPr>
-            </a:lvl2pPr>
-            <a:lvl3pPr marL="914400" algn="l" defTabSz="914400" rtl="0" eaLnBrk="1" latinLnBrk="0" hangingPunct="1">
-              <a:defRPr sz="1800" kern="1200">
-                <a:solidFill>
-                  <a:schemeClr val="lt1"/>
-                </a:solidFill>
-                <a:latin typeface="+mn-lt"/>
-                <a:ea typeface="+mn-ea"/>
-                <a:cs typeface="+mn-cs"/>
-              </a:defRPr>
-            </a:lvl3pPr>
-            <a:lvl4pPr marL="1371600" algn="l" defTabSz="914400" rtl="0" eaLnBrk="1" latinLnBrk="0" hangingPunct="1">
-              <a:defRPr sz="1800" kern="1200">
-                <a:solidFill>
-                  <a:schemeClr val="lt1"/>
-                </a:solidFill>
-                <a:latin typeface="+mn-lt"/>
-                <a:ea typeface="+mn-ea"/>
-                <a:cs typeface="+mn-cs"/>
-              </a:defRPr>
-            </a:lvl4pPr>
-            <a:lvl5pPr marL="1828800" algn="l" defTabSz="914400" rtl="0" eaLnBrk="1" latinLnBrk="0" hangingPunct="1">
-              <a:defRPr sz="1800" kern="1200">
-                <a:solidFill>
-                  <a:schemeClr val="lt1"/>
-                </a:solidFill>
-                <a:latin typeface="+mn-lt"/>
-                <a:ea typeface="+mn-ea"/>
-                <a:cs typeface="+mn-cs"/>
-              </a:defRPr>
-            </a:lvl5pPr>
-            <a:lvl6pPr marL="2286000" algn="l" defTabSz="914400" rtl="0" eaLnBrk="1" latinLnBrk="0" hangingPunct="1">
-              <a:defRPr sz="1800" kern="1200">
-                <a:solidFill>
-                  <a:schemeClr val="lt1"/>
-                </a:solidFill>
-                <a:latin typeface="+mn-lt"/>
-                <a:ea typeface="+mn-ea"/>
-                <a:cs typeface="+mn-cs"/>
-              </a:defRPr>
-            </a:lvl6pPr>
-            <a:lvl7pPr marL="2743200" algn="l" defTabSz="914400" rtl="0" eaLnBrk="1" latinLnBrk="0" hangingPunct="1">
-              <a:defRPr sz="1800" kern="1200">
-                <a:solidFill>
-                  <a:schemeClr val="lt1"/>
-                </a:solidFill>
-                <a:latin typeface="+mn-lt"/>
-                <a:ea typeface="+mn-ea"/>
-                <a:cs typeface="+mn-cs"/>
-              </a:defRPr>
-            </a:lvl7pPr>
-            <a:lvl8pPr marL="3200400" algn="l" defTabSz="914400" rtl="0" eaLnBrk="1" latinLnBrk="0" hangingPunct="1">
-              <a:defRPr sz="1800" kern="1200">
-                <a:solidFill>
-                  <a:schemeClr val="lt1"/>
-                </a:solidFill>
-                <a:latin typeface="+mn-lt"/>
-                <a:ea typeface="+mn-ea"/>
-                <a:cs typeface="+mn-cs"/>
-              </a:defRPr>
-            </a:lvl8pPr>
-            <a:lvl9pPr marL="3657600" algn="l" defTabSz="914400" rtl="0" eaLnBrk="1" latinLnBrk="0" hangingPunct="1">
-              <a:defRPr sz="1800" kern="1200">
-                <a:solidFill>
-                  <a:schemeClr val="lt1"/>
-                </a:solidFill>
-                <a:latin typeface="+mn-lt"/>
-                <a:ea typeface="+mn-ea"/>
-                <a:cs typeface="+mn-cs"/>
-              </a:defRPr>
-            </a:lvl9pPr>
-          </a:lstStyle>
-          <a:p>
-            <a:pPr algn="ctr"/>
-            <a:endParaRPr lang="en-US"/>
-          </a:p>
-        </p:txBody>
-      </p:sp>
-      <p:sp useBgFill="1">
-        <p:nvSpPr>
-          <p:cNvPr id="10" name="Rectangle 9">
-            <a:extLst>
-              <a:ext uri="{FF2B5EF4-FFF2-40B4-BE49-F238E27FC236}">
-                <a16:creationId xmlns:a16="http://schemas.microsoft.com/office/drawing/2014/main" id="{252FEFEF-6AC0-46B6-AC09-11FC56196FA4}"/>
-              </a:ext>
-              <a:ext uri="{C183D7F6-B498-43B3-948B-1728B52AA6E4}">
-                <adec:decorative xmlns:adec="http://schemas.microsoft.com/office/drawing/2017/decorative" val="1"/>
-              </a:ext>
-            </a:extLst>
-          </p:cNvPr>
-          <p:cNvSpPr>
-            <a:spLocks noGrp="1" noRot="1" noChangeAspect="1" noMove="1" noResize="1" noEditPoints="1" noAdjustHandles="1" noChangeArrowheads="1" noChangeShapeType="1" noTextEdit="1"/>
-          </p:cNvSpPr>
-          <p:nvPr>
-            <p:extLst>
-              <p:ext uri="{386F3935-93C4-4BCD-93E2-E3B085C9AB24}">
-                <p16:designElem xmlns:p16="http://schemas.microsoft.com/office/powerpoint/2015/main" val="1"/>
-              </p:ext>
-            </p:extLst>
-          </p:nvPr>
-        </p:nvSpPr>
-        <p:spPr>
-          <a:xfrm>
-            <a:off x="210312" y="226665"/>
-            <a:ext cx="11722608" cy="6382512"/>
-          </a:xfrm>
-          <a:prstGeom prst="rect">
-            <a:avLst/>
-          </a:prstGeom>
-          <a:ln w="6350" cap="flat" cmpd="sng" algn="ctr">
-            <a:noFill/>
-            <a:prstDash val="solid"/>
-          </a:ln>
-          <a:effectLst>
-            <a:softEdge rad="0"/>
-          </a:effectLst>
-        </p:spPr>
-      </p:sp>
-      <p:sp>
-        <p:nvSpPr>
-          <p:cNvPr id="2" name="Title 1">
-            <a:extLst>
-              <a:ext uri="{FF2B5EF4-FFF2-40B4-BE49-F238E27FC236}">
-                <a16:creationId xmlns:a16="http://schemas.microsoft.com/office/drawing/2014/main" id="{C475F94E-71D8-4CB0-9ACA-83C2E1DBFB2A}"/>
-              </a:ext>
-            </a:extLst>
-          </p:cNvPr>
-          <p:cNvSpPr>
-            <a:spLocks noGrp="1"/>
-          </p:cNvSpPr>
-          <p:nvPr>
-            <p:ph type="title"/>
-          </p:nvPr>
-        </p:nvSpPr>
-        <p:spPr>
-          <a:xfrm>
-            <a:off x="1175512" y="870132"/>
-            <a:ext cx="9792208" cy="1527078"/>
-          </a:xfrm>
-        </p:spPr>
-        <p:txBody>
-          <a:bodyPr>
-            <a:normAutofit/>
-          </a:bodyPr>
-          <a:lstStyle/>
-          <a:p>
             <a:r>
-              <a:rPr lang="en-AU" dirty="0"/>
-              <a:t>SPARE PAGE</a:t>
+              <a:rPr lang="en-AU" sz="2400" dirty="0">
+                <a:latin typeface="+mj-lt"/>
+                <a:sym typeface="Wingdings" panose="05000000000000000000" pitchFamily="2" charset="2"/>
+              </a:rPr>
+              <a:t></a:t>
             </a:r>
-            <a:br>
-              <a:rPr lang="en-AU" dirty="0"/>
-            </a:br>
-            <a:endParaRPr lang="en-AU" dirty="0"/>
-          </a:p>
-        </p:txBody>
-      </p:sp>
-      <p:sp>
-        <p:nvSpPr>
-          <p:cNvPr id="3" name="Content Placeholder 2">
-            <a:extLst>
-              <a:ext uri="{FF2B5EF4-FFF2-40B4-BE49-F238E27FC236}">
-                <a16:creationId xmlns:a16="http://schemas.microsoft.com/office/drawing/2014/main" id="{271577FC-B92F-4A56-ADB5-499415970C46}"/>
-              </a:ext>
-            </a:extLst>
-          </p:cNvPr>
-          <p:cNvSpPr>
-            <a:spLocks noGrp="1"/>
-          </p:cNvSpPr>
-          <p:nvPr>
-            <p:ph idx="1"/>
-          </p:nvPr>
-        </p:nvSpPr>
-        <p:spPr>
-          <a:xfrm>
-            <a:off x="1175512" y="2557849"/>
-            <a:ext cx="9792208" cy="3407862"/>
-          </a:xfrm>
-        </p:spPr>
-        <p:txBody>
-          <a:bodyPr>
-            <a:normAutofit/>
-          </a:bodyPr>
-          <a:lstStyle/>
-          <a:p>
-            <a:endParaRPr lang="en-AU"/>
+            <a:endParaRPr lang="en-AU" sz="2400" dirty="0">
+              <a:latin typeface="+mj-lt"/>
+            </a:endParaRPr>
           </a:p>
         </p:txBody>
       </p:sp>
@@ -11032,7 +10376,7 @@
         </p:spPr>
         <p:txBody>
           <a:bodyPr>
-            <a:normAutofit fontScale="92500" lnSpcReduction="20000"/>
+            <a:normAutofit fontScale="85000" lnSpcReduction="10000"/>
           </a:bodyPr>
           <a:lstStyle/>
           <a:p>
@@ -11042,6 +10386,14 @@
               </a:rPr>
               <a:t>Deciding whether you want a recipe or restaurant.</a:t>
             </a:r>
+            <a:br>
+              <a:rPr lang="en-AU" sz="2400" dirty="0">
+                <a:latin typeface="+mj-lt"/>
+              </a:rPr>
+            </a:br>
+            <a:endParaRPr lang="en-AU" sz="2400" dirty="0">
+              <a:latin typeface="+mj-lt"/>
+            </a:endParaRPr>
           </a:p>
           <a:p>
             <a:r>
@@ -11877,10 +11229,10 @@
       </p:grpSpPr>
       <p:sp>
         <p:nvSpPr>
-          <p:cNvPr id="17" name="Rectangle 16">
+          <p:cNvPr id="8" name="Rectangle 7">
             <a:extLst>
               <a:ext uri="{FF2B5EF4-FFF2-40B4-BE49-F238E27FC236}">
-                <a16:creationId xmlns:a16="http://schemas.microsoft.com/office/drawing/2014/main" id="{2DC4AA0A-D9C3-4A0B-990D-1BCB0022A696}"/>
+                <a16:creationId xmlns:a16="http://schemas.microsoft.com/office/drawing/2014/main" id="{70120F84-A866-4D9F-8B1C-9120A013D654}"/>
               </a:ext>
               <a:ext uri="{C183D7F6-B498-43B3-948B-1728B52AA6E4}">
                 <adec:decorative xmlns:adec="http://schemas.microsoft.com/office/drawing/2017/decorative" val="1"/>
@@ -11900,14 +11252,14 @@
         </p:nvSpPr>
         <p:spPr>
           <a:xfrm>
-            <a:off x="-1867" y="0"/>
-            <a:ext cx="12193867" cy="6858000"/>
+            <a:off x="0" y="0"/>
+            <a:ext cx="12192001" cy="6858000"/>
           </a:xfrm>
           <a:prstGeom prst="rect">
             <a:avLst/>
           </a:prstGeom>
           <a:solidFill>
-            <a:srgbClr val="FFFFFF"/>
+            <a:schemeClr val="accent1"/>
           </a:solidFill>
           <a:ln>
             <a:noFill/>
@@ -11930,50 +11282,119 @@
           </a:fontRef>
         </p:style>
         <p:txBody>
-          <a:bodyPr rtlCol="0" anchor="ctr"/>
-          <a:lstStyle/>
+          <a:bodyPr rot="0" spcFirstLastPara="0" vert="horz" wrap="square" lIns="91440" tIns="45720" rIns="91440" bIns="45720" numCol="1" spcCol="0" rtlCol="0" fromWordArt="0" anchor="ctr" anchorCtr="0" forceAA="0" compatLnSpc="1">
+            <a:prstTxWarp prst="textNoShape">
+              <a:avLst/>
+            </a:prstTxWarp>
+            <a:noAutofit/>
+          </a:bodyPr>
+          <a:lstStyle>
+            <a:defPPr>
+              <a:defRPr lang="en-US"/>
+            </a:defPPr>
+            <a:lvl1pPr marL="0" algn="l" defTabSz="914400" rtl="0" eaLnBrk="1" latinLnBrk="0" hangingPunct="1">
+              <a:defRPr sz="1800" kern="1200">
+                <a:solidFill>
+                  <a:schemeClr val="lt1"/>
+                </a:solidFill>
+                <a:latin typeface="+mn-lt"/>
+                <a:ea typeface="+mn-ea"/>
+                <a:cs typeface="+mn-cs"/>
+              </a:defRPr>
+            </a:lvl1pPr>
+            <a:lvl2pPr marL="457200" algn="l" defTabSz="914400" rtl="0" eaLnBrk="1" latinLnBrk="0" hangingPunct="1">
+              <a:defRPr sz="1800" kern="1200">
+                <a:solidFill>
+                  <a:schemeClr val="lt1"/>
+                </a:solidFill>
+                <a:latin typeface="+mn-lt"/>
+                <a:ea typeface="+mn-ea"/>
+                <a:cs typeface="+mn-cs"/>
+              </a:defRPr>
+            </a:lvl2pPr>
+            <a:lvl3pPr marL="914400" algn="l" defTabSz="914400" rtl="0" eaLnBrk="1" latinLnBrk="0" hangingPunct="1">
+              <a:defRPr sz="1800" kern="1200">
+                <a:solidFill>
+                  <a:schemeClr val="lt1"/>
+                </a:solidFill>
+                <a:latin typeface="+mn-lt"/>
+                <a:ea typeface="+mn-ea"/>
+                <a:cs typeface="+mn-cs"/>
+              </a:defRPr>
+            </a:lvl3pPr>
+            <a:lvl4pPr marL="1371600" algn="l" defTabSz="914400" rtl="0" eaLnBrk="1" latinLnBrk="0" hangingPunct="1">
+              <a:defRPr sz="1800" kern="1200">
+                <a:solidFill>
+                  <a:schemeClr val="lt1"/>
+                </a:solidFill>
+                <a:latin typeface="+mn-lt"/>
+                <a:ea typeface="+mn-ea"/>
+                <a:cs typeface="+mn-cs"/>
+              </a:defRPr>
+            </a:lvl4pPr>
+            <a:lvl5pPr marL="1828800" algn="l" defTabSz="914400" rtl="0" eaLnBrk="1" latinLnBrk="0" hangingPunct="1">
+              <a:defRPr sz="1800" kern="1200">
+                <a:solidFill>
+                  <a:schemeClr val="lt1"/>
+                </a:solidFill>
+                <a:latin typeface="+mn-lt"/>
+                <a:ea typeface="+mn-ea"/>
+                <a:cs typeface="+mn-cs"/>
+              </a:defRPr>
+            </a:lvl5pPr>
+            <a:lvl6pPr marL="2286000" algn="l" defTabSz="914400" rtl="0" eaLnBrk="1" latinLnBrk="0" hangingPunct="1">
+              <a:defRPr sz="1800" kern="1200">
+                <a:solidFill>
+                  <a:schemeClr val="lt1"/>
+                </a:solidFill>
+                <a:latin typeface="+mn-lt"/>
+                <a:ea typeface="+mn-ea"/>
+                <a:cs typeface="+mn-cs"/>
+              </a:defRPr>
+            </a:lvl6pPr>
+            <a:lvl7pPr marL="2743200" algn="l" defTabSz="914400" rtl="0" eaLnBrk="1" latinLnBrk="0" hangingPunct="1">
+              <a:defRPr sz="1800" kern="1200">
+                <a:solidFill>
+                  <a:schemeClr val="lt1"/>
+                </a:solidFill>
+                <a:latin typeface="+mn-lt"/>
+                <a:ea typeface="+mn-ea"/>
+                <a:cs typeface="+mn-cs"/>
+              </a:defRPr>
+            </a:lvl7pPr>
+            <a:lvl8pPr marL="3200400" algn="l" defTabSz="914400" rtl="0" eaLnBrk="1" latinLnBrk="0" hangingPunct="1">
+              <a:defRPr sz="1800" kern="1200">
+                <a:solidFill>
+                  <a:schemeClr val="lt1"/>
+                </a:solidFill>
+                <a:latin typeface="+mn-lt"/>
+                <a:ea typeface="+mn-ea"/>
+                <a:cs typeface="+mn-cs"/>
+              </a:defRPr>
+            </a:lvl8pPr>
+            <a:lvl9pPr marL="3657600" algn="l" defTabSz="914400" rtl="0" eaLnBrk="1" latinLnBrk="0" hangingPunct="1">
+              <a:defRPr sz="1800" kern="1200">
+                <a:solidFill>
+                  <a:schemeClr val="lt1"/>
+                </a:solidFill>
+                <a:latin typeface="+mn-lt"/>
+                <a:ea typeface="+mn-ea"/>
+                <a:cs typeface="+mn-cs"/>
+              </a:defRPr>
+            </a:lvl9pPr>
+          </a:lstStyle>
           <a:p>
             <a:pPr algn="ctr"/>
-            <a:endParaRPr lang="en-US" dirty="0"/>
+            <a:endParaRPr lang="en-US"/>
           </a:p>
         </p:txBody>
       </p:sp>
-      <p:pic>
-        <p:nvPicPr>
-          <p:cNvPr id="12" name="Picture 11">
+      <p:sp useBgFill="1">
+        <p:nvSpPr>
+          <p:cNvPr id="10" name="Rectangle 9">
             <a:extLst>
               <a:ext uri="{FF2B5EF4-FFF2-40B4-BE49-F238E27FC236}">
-                <a16:creationId xmlns:a16="http://schemas.microsoft.com/office/drawing/2014/main" id="{8FAD867A-2549-4058-B44A-32D0A3F37BE1}"/>
-              </a:ext>
-            </a:extLst>
-          </p:cNvPr>
-          <p:cNvPicPr>
-            <a:picLocks noChangeAspect="1"/>
-          </p:cNvPicPr>
-          <p:nvPr/>
-        </p:nvPicPr>
-        <p:blipFill>
-          <a:blip r:embed="rId2"/>
-          <a:stretch>
-            <a:fillRect/>
-          </a:stretch>
-        </p:blipFill>
-        <p:spPr>
-          <a:xfrm>
-            <a:off x="2696486" y="648231"/>
-            <a:ext cx="6773332" cy="3217333"/>
-          </a:xfrm>
-          <a:prstGeom prst="rect">
-            <a:avLst/>
-          </a:prstGeom>
-        </p:spPr>
-      </p:pic>
-      <p:sp>
-        <p:nvSpPr>
-          <p:cNvPr id="19" name="Rectangle 18">
-            <a:extLst>
-              <a:ext uri="{FF2B5EF4-FFF2-40B4-BE49-F238E27FC236}">
-                <a16:creationId xmlns:a16="http://schemas.microsoft.com/office/drawing/2014/main" id="{370878C7-7719-40BD-AA97-751A85670594}"/>
+                <a16:creationId xmlns:a16="http://schemas.microsoft.com/office/drawing/2014/main" id="{252FEFEF-6AC0-46B6-AC09-11FC56196FA4}"/>
               </a:ext>
               <a:ext uri="{C183D7F6-B498-43B3-948B-1728B52AA6E4}">
                 <adec:decorative xmlns:adec="http://schemas.microsoft.com/office/drawing/2017/decorative" val="1"/>
@@ -11993,69 +11414,19 @@
         </p:nvSpPr>
         <p:spPr>
           <a:xfrm>
-            <a:off x="630501" y="4212709"/>
-            <a:ext cx="10905302" cy="1997060"/>
+            <a:off x="210312" y="226665"/>
+            <a:ext cx="11722608" cy="6382512"/>
           </a:xfrm>
           <a:prstGeom prst="rect">
             <a:avLst/>
           </a:prstGeom>
-          <a:solidFill>
-            <a:srgbClr val="434F5A"/>
-          </a:solidFill>
           <a:ln w="6350" cap="flat" cmpd="sng" algn="ctr">
             <a:noFill/>
             <a:prstDash val="solid"/>
           </a:ln>
           <a:effectLst>
-            <a:outerShdw blurRad="50800" algn="ctr" rotWithShape="0">
-              <a:prstClr val="black">
-                <a:alpha val="66000"/>
-              </a:prstClr>
-            </a:outerShdw>
             <a:softEdge rad="0"/>
           </a:effectLst>
-        </p:spPr>
-      </p:sp>
-      <p:sp>
-        <p:nvSpPr>
-          <p:cNvPr id="21" name="Rectangle 20">
-            <a:extLst>
-              <a:ext uri="{FF2B5EF4-FFF2-40B4-BE49-F238E27FC236}">
-                <a16:creationId xmlns:a16="http://schemas.microsoft.com/office/drawing/2014/main" id="{1D9D3865-C494-4C4A-8495-8245E905469D}"/>
-              </a:ext>
-              <a:ext uri="{C183D7F6-B498-43B3-948B-1728B52AA6E4}">
-                <adec:decorative xmlns:adec="http://schemas.microsoft.com/office/drawing/2017/decorative" val="1"/>
-              </a:ext>
-            </a:extLst>
-          </p:cNvPr>
-          <p:cNvSpPr>
-            <a:spLocks noGrp="1" noRot="1" noChangeAspect="1" noMove="1" noResize="1" noEditPoints="1" noAdjustHandles="1" noChangeArrowheads="1" noChangeShapeType="1" noTextEdit="1"/>
-          </p:cNvSpPr>
-          <p:nvPr>
-            <p:extLst>
-              <p:ext uri="{386F3935-93C4-4BCD-93E2-E3B085C9AB24}">
-                <p16:designElem xmlns:p16="http://schemas.microsoft.com/office/powerpoint/2015/main" val="1"/>
-              </p:ext>
-            </p:extLst>
-          </p:nvPr>
-        </p:nvSpPr>
-        <p:spPr>
-          <a:xfrm>
-            <a:off x="793348" y="4379135"/>
-            <a:ext cx="10579608" cy="1664208"/>
-          </a:xfrm>
-          <a:prstGeom prst="rect">
-            <a:avLst/>
-          </a:prstGeom>
-          <a:noFill/>
-          <a:ln w="6350" cap="sq" cmpd="sng" algn="ctr">
-            <a:solidFill>
-              <a:schemeClr val="tx1"/>
-            </a:solidFill>
-            <a:prstDash val="solid"/>
-            <a:miter lim="800000"/>
-          </a:ln>
-          <a:effectLst/>
         </p:spPr>
       </p:sp>
       <p:sp>
@@ -12063,7 +11434,7 @@
           <p:cNvPr id="2" name="Title 1">
             <a:extLst>
               <a:ext uri="{FF2B5EF4-FFF2-40B4-BE49-F238E27FC236}">
-                <a16:creationId xmlns:a16="http://schemas.microsoft.com/office/drawing/2014/main" id="{D25339D6-7735-479B-A027-73FEB020D80F}"/>
+                <a16:creationId xmlns:a16="http://schemas.microsoft.com/office/drawing/2014/main" id="{BC2EF8E3-22DF-4A93-BC23-A6F0C041C713}"/>
               </a:ext>
             </a:extLst>
           </p:cNvPr>
@@ -12076,8 +11447,8 @@
         </p:nvSpPr>
         <p:spPr>
           <a:xfrm>
-            <a:off x="956234" y="4495894"/>
-            <a:ext cx="4942542" cy="1371600"/>
+            <a:off x="1175512" y="870132"/>
+            <a:ext cx="9792208" cy="1527078"/>
           </a:xfrm>
         </p:spPr>
         <p:txBody>
@@ -12086,88 +11457,23 @@
           </a:bodyPr>
           <a:lstStyle/>
           <a:p>
-            <a:pPr algn="r"/>
             <a:r>
-              <a:rPr lang="en-AU" sz="3100" dirty="0">
-                <a:solidFill>
-                  <a:schemeClr val="tx1"/>
-                </a:solidFill>
-              </a:rPr>
-              <a:t>DEMO OF APP’S FUNCTIONS</a:t>
+              <a:rPr lang="en-AU" dirty="0"/>
+              <a:t>PROBLEMS WE FACED.</a:t>
             </a:r>
             <a:br>
-              <a:rPr lang="en-AU" sz="3100" dirty="0">
-                <a:solidFill>
-                  <a:schemeClr val="tx1"/>
-                </a:solidFill>
-              </a:rPr>
+              <a:rPr lang="en-AU" dirty="0"/>
             </a:br>
-            <a:endParaRPr lang="en-AU" sz="3100" dirty="0">
-              <a:solidFill>
-                <a:schemeClr val="tx1"/>
-              </a:solidFill>
-            </a:endParaRPr>
+            <a:endParaRPr lang="en-AU" dirty="0"/>
           </a:p>
         </p:txBody>
       </p:sp>
-      <p:cxnSp>
-        <p:nvCxnSpPr>
-          <p:cNvPr id="23" name="Straight Connector 22">
-            <a:extLst>
-              <a:ext uri="{FF2B5EF4-FFF2-40B4-BE49-F238E27FC236}">
-                <a16:creationId xmlns:a16="http://schemas.microsoft.com/office/drawing/2014/main" id="{B78EE79F-FCAA-4CF9-9746-730B51FC4CB3}"/>
-              </a:ext>
-              <a:ext uri="{C183D7F6-B498-43B3-948B-1728B52AA6E4}">
-                <adec:decorative xmlns:adec="http://schemas.microsoft.com/office/drawing/2017/decorative" val="1"/>
-              </a:ext>
-            </a:extLst>
-          </p:cNvPr>
-          <p:cNvCxnSpPr>
-            <a:cxnSpLocks noGrp="1" noRot="1" noChangeAspect="1" noMove="1" noResize="1" noEditPoints="1" noAdjustHandles="1" noChangeArrowheads="1" noChangeShapeType="1"/>
-          </p:cNvCxnSpPr>
-          <p:nvPr>
-            <p:extLst>
-              <p:ext uri="{386F3935-93C4-4BCD-93E2-E3B085C9AB24}">
-                <p16:designElem xmlns:p16="http://schemas.microsoft.com/office/powerpoint/2015/main" val="1"/>
-              </p:ext>
-            </p:extLst>
-          </p:nvPr>
-        </p:nvCxnSpPr>
-        <p:spPr>
-          <a:xfrm>
-            <a:off x="6096000" y="4634895"/>
-            <a:ext cx="0" cy="1152689"/>
-          </a:xfrm>
-          <a:prstGeom prst="line">
-            <a:avLst/>
-          </a:prstGeom>
-          <a:ln>
-            <a:solidFill>
-              <a:schemeClr val="tx1"/>
-            </a:solidFill>
-          </a:ln>
-        </p:spPr>
-        <p:style>
-          <a:lnRef idx="1">
-            <a:schemeClr val="accent1"/>
-          </a:lnRef>
-          <a:fillRef idx="0">
-            <a:schemeClr val="accent1"/>
-          </a:fillRef>
-          <a:effectRef idx="0">
-            <a:schemeClr val="accent1"/>
-          </a:effectRef>
-          <a:fontRef idx="minor">
-            <a:schemeClr val="tx1"/>
-          </a:fontRef>
-        </p:style>
-      </p:cxnSp>
       <p:sp>
         <p:nvSpPr>
           <p:cNvPr id="3" name="Content Placeholder 2">
             <a:extLst>
               <a:ext uri="{FF2B5EF4-FFF2-40B4-BE49-F238E27FC236}">
-                <a16:creationId xmlns:a16="http://schemas.microsoft.com/office/drawing/2014/main" id="{B252B49F-43AA-4A63-89E6-478A159E8EC5}"/>
+                <a16:creationId xmlns:a16="http://schemas.microsoft.com/office/drawing/2014/main" id="{FE5849D2-BE52-4659-9D70-26A04732A30F}"/>
               </a:ext>
             </a:extLst>
           </p:cNvPr>
@@ -12180,32 +11486,101 @@
         </p:nvSpPr>
         <p:spPr>
           <a:xfrm>
-            <a:off x="6256866" y="4787922"/>
-            <a:ext cx="4978899" cy="1152690"/>
+            <a:off x="1175512" y="2225040"/>
+            <a:ext cx="9792208" cy="3740671"/>
           </a:xfrm>
         </p:spPr>
         <p:txBody>
-          <a:bodyPr anchor="ctr">
-            <a:normAutofit fontScale="92500" lnSpcReduction="20000"/>
+          <a:bodyPr>
+            <a:normAutofit lnSpcReduction="10000"/>
           </a:bodyPr>
           <a:lstStyle/>
           <a:p>
             <a:r>
-              <a:rPr lang="en-AU" sz="2800" u="sng" dirty="0">
+              <a:rPr lang="en-AU" sz="2400" dirty="0">
                 <a:latin typeface="+mj-lt"/>
-                <a:hlinkClick r:id="rId3">
-                  <a:extLst>
-                    <a:ext uri="{A12FA001-AC4F-418D-AE19-62706E023703}">
-                      <ahyp:hlinkClr xmlns:ahyp="http://schemas.microsoft.com/office/drawing/2018/hyperlinkcolor" val="tx"/>
-                    </a:ext>
-                  </a:extLst>
-                </a:hlinkClick>
               </a:rPr>
-              <a:t>https://daniel-brewer-stephenson.github.io/project1/</a:t>
+              <a:t>Restaurant API Zomato wasn’t working.</a:t>
             </a:r>
-            <a:endParaRPr lang="en-AU" sz="2800" u="sng" dirty="0">
+            <a:br>
+              <a:rPr lang="en-AU" sz="2400" dirty="0">
+                <a:latin typeface="+mj-lt"/>
+              </a:rPr>
+            </a:br>
+            <a:endParaRPr lang="en-AU" sz="2400" dirty="0">
               <a:latin typeface="+mj-lt"/>
             </a:endParaRPr>
+          </a:p>
+          <a:p>
+            <a:r>
+              <a:rPr lang="en-AU" sz="2400" dirty="0">
+                <a:latin typeface="+mj-lt"/>
+              </a:rPr>
+              <a:t>Time constraints.</a:t>
+            </a:r>
+            <a:br>
+              <a:rPr lang="en-AU" sz="2400" dirty="0">
+                <a:latin typeface="+mj-lt"/>
+              </a:rPr>
+            </a:br>
+            <a:endParaRPr lang="en-AU" sz="2400" dirty="0">
+              <a:latin typeface="+mj-lt"/>
+            </a:endParaRPr>
+          </a:p>
+          <a:p>
+            <a:r>
+              <a:rPr lang="en-AU" sz="2400" dirty="0">
+                <a:latin typeface="+mj-lt"/>
+              </a:rPr>
+              <a:t>Cost Restraints.</a:t>
+            </a:r>
+            <a:br>
+              <a:rPr lang="en-AU" sz="2400" dirty="0">
+                <a:latin typeface="+mj-lt"/>
+              </a:rPr>
+            </a:br>
+            <a:endParaRPr lang="en-AU" sz="2400" dirty="0">
+              <a:latin typeface="+mj-lt"/>
+            </a:endParaRPr>
+          </a:p>
+          <a:p>
+            <a:r>
+              <a:rPr lang="en-AU" sz="2400" dirty="0">
+                <a:latin typeface="+mj-lt"/>
+              </a:rPr>
+              <a:t>Front End/Back End code clashes.</a:t>
+            </a:r>
+            <a:br>
+              <a:rPr lang="en-AU" sz="2400" dirty="0">
+                <a:latin typeface="+mj-lt"/>
+              </a:rPr>
+            </a:br>
+            <a:endParaRPr lang="en-AU" sz="2400" dirty="0">
+              <a:latin typeface="+mj-lt"/>
+            </a:endParaRPr>
+          </a:p>
+          <a:p>
+            <a:r>
+              <a:rPr lang="en-AU" sz="2400" dirty="0">
+                <a:latin typeface="+mj-lt"/>
+              </a:rPr>
+              <a:t>Inexperience with </a:t>
+            </a:r>
+            <a:r>
+              <a:rPr lang="en-AU" sz="2400" dirty="0" err="1">
+                <a:latin typeface="+mj-lt"/>
+              </a:rPr>
+              <a:t>Github</a:t>
+            </a:r>
+            <a:r>
+              <a:rPr lang="en-AU" sz="2400" dirty="0">
+                <a:latin typeface="+mj-lt"/>
+              </a:rPr>
+              <a:t> – push and pull.</a:t>
+            </a:r>
+          </a:p>
+          <a:p>
+            <a:endParaRPr lang="en-AU" dirty="0"/>
           </a:p>
           <a:p>
             <a:endParaRPr lang="en-AU" dirty="0"/>
@@ -12215,12 +11590,12 @@
     </p:spTree>
     <p:extLst>
       <p:ext uri="{BB962C8B-B14F-4D97-AF65-F5344CB8AC3E}">
-        <p14:creationId xmlns:p14="http://schemas.microsoft.com/office/powerpoint/2010/main" val="2917685803"/>
+        <p14:creationId xmlns:p14="http://schemas.microsoft.com/office/powerpoint/2010/main" val="3028509899"/>
       </p:ext>
     </p:extLst>
   </p:cSld>
   <p:clrMapOvr>
-    <a:overrideClrMapping bg1="dk1" tx1="lt1" bg2="dk2" tx2="lt2" accent1="accent1" accent2="accent2" accent3="accent3" accent4="accent4" accent5="accent5" accent6="accent6" hlink="hlink" folHlink="folHlink"/>
+    <a:masterClrMapping/>
   </p:clrMapOvr>
 </p:sld>
 </file>
@@ -12519,7 +11894,12 @@
           </a:bodyPr>
           <a:lstStyle/>
           <a:p>
-            <a:endParaRPr lang="en-AU"/>
+            <a:r>
+              <a:rPr lang="en-AU" sz="2400" dirty="0">
+                <a:latin typeface="+mj-lt"/>
+              </a:rPr>
+              <a:t>Making a restaurant locater. </a:t>
+            </a:r>
           </a:p>
         </p:txBody>
       </p:sp>

</xml_diff>

<commit_message>
index intro + powerpoint changes
</commit_message>
<xml_diff>
--- a/assets/powerpoint/eatUP Powerpoint.pptx
+++ b/assets/powerpoint/eatUP Powerpoint.pptx
@@ -4401,7 +4401,7 @@
           <a:p>
             <a:fld id="{EA0C0817-A112-4847-8014-A94B7D2A4EA3}" type="datetime1">
               <a:rPr lang="en-US" smtClean="0"/>
-              <a:t>11/9/2019</a:t>
+              <a:t>11/11/2019</a:t>
             </a:fld>
             <a:endParaRPr lang="en-US" dirty="0"/>
           </a:p>
@@ -4603,7 +4603,7 @@
           <a:p>
             <a:fld id="{134F40B7-36AB-4376-BE14-EF7004D79BB9}" type="datetime1">
               <a:rPr lang="en-US" smtClean="0"/>
-              <a:t>11/9/2019</a:t>
+              <a:t>11/11/2019</a:t>
             </a:fld>
             <a:endParaRPr lang="en-US"/>
           </a:p>
@@ -4783,7 +4783,7 @@
           <a:p>
             <a:fld id="{FF87CAB8-DCAE-46A5-AADA-B3FAD11A54E0}" type="datetime1">
               <a:rPr lang="en-US" smtClean="0"/>
-              <a:t>11/9/2019</a:t>
+              <a:t>11/11/2019</a:t>
             </a:fld>
             <a:endParaRPr lang="en-US"/>
           </a:p>
@@ -4953,7 +4953,7 @@
           <a:p>
             <a:fld id="{7332B432-ACDA-4023-A761-2BAB76577B62}" type="datetime1">
               <a:rPr lang="en-US" smtClean="0"/>
-              <a:t>11/9/2019</a:t>
+              <a:t>11/11/2019</a:t>
             </a:fld>
             <a:endParaRPr lang="en-US"/>
           </a:p>
@@ -5552,7 +5552,7 @@
           <a:p>
             <a:fld id="{D9C646AA-F36E-4540-911D-FFFC0A0EF24A}" type="datetime1">
               <a:rPr lang="en-US" smtClean="0"/>
-              <a:t>11/9/2019</a:t>
+              <a:t>11/11/2019</a:t>
             </a:fld>
             <a:endParaRPr lang="en-US" dirty="0"/>
           </a:p>
@@ -5872,7 +5872,7 @@
           <a:p>
             <a:fld id="{69186D26-FA5F-4637-B602-B7C2DC34CFD4}" type="datetime1">
               <a:rPr lang="en-US" smtClean="0"/>
-              <a:t>11/9/2019</a:t>
+              <a:t>11/11/2019</a:t>
             </a:fld>
             <a:endParaRPr lang="en-US"/>
           </a:p>
@@ -6307,7 +6307,7 @@
           <a:p>
             <a:fld id="{8A7F15D8-96D1-4781-BC50-CA8A088B2FE4}" type="datetime1">
               <a:rPr lang="en-US" smtClean="0"/>
-              <a:t>11/9/2019</a:t>
+              <a:t>11/11/2019</a:t>
             </a:fld>
             <a:endParaRPr lang="en-US"/>
           </a:p>
@@ -6425,7 +6425,7 @@
           <a:p>
             <a:fld id="{F9A96C99-B8F8-4528-BD05-0E16E943DC09}" type="datetime1">
               <a:rPr lang="en-US" smtClean="0"/>
-              <a:t>11/9/2019</a:t>
+              <a:t>11/11/2019</a:t>
             </a:fld>
             <a:endParaRPr lang="en-US"/>
           </a:p>
@@ -6520,7 +6520,7 @@
           <a:p>
             <a:fld id="{03636942-C211-4B28-8DBD-C953E00AF71B}" type="datetime1">
               <a:rPr lang="en-US" smtClean="0"/>
-              <a:t>11/9/2019</a:t>
+              <a:t>11/11/2019</a:t>
             </a:fld>
             <a:endParaRPr lang="en-US"/>
           </a:p>
@@ -6937,7 +6937,7 @@
           <a:p>
             <a:fld id="{7E8D12A6-918A-48BD-8CB9-CA713993B0EA}" type="datetime1">
               <a:rPr lang="en-US" smtClean="0"/>
-              <a:t>11/9/2019</a:t>
+              <a:t>11/11/2019</a:t>
             </a:fld>
             <a:endParaRPr lang="en-US"/>
           </a:p>
@@ -7199,7 +7199,7 @@
             <a:fld id="{E778CE86-875F-4587-BCF6-FA054AFC0D53}" type="datetime1">
               <a:rPr lang="en-US" smtClean="0"/>
               <a:pPr/>
-              <a:t>11/9/2019</a:t>
+              <a:t>11/11/2019</a:t>
             </a:fld>
             <a:endParaRPr lang="en-US" dirty="0"/>
           </a:p>
@@ -7715,7 +7715,7 @@
           <a:p>
             <a:fld id="{F6FA2B21-3FCD-4721-B95C-427943F61125}" type="datetime1">
               <a:rPr lang="en-US" smtClean="0"/>
-              <a:t>11/9/2019</a:t>
+              <a:t>11/11/2019</a:t>
             </a:fld>
             <a:endParaRPr lang="en-US"/>
           </a:p>
@@ -8386,7 +8386,7 @@
               <a:rPr lang="en-AU" dirty="0">
                 <a:latin typeface="+mj-lt"/>
               </a:rPr>
-              <a:t>Mani, Brad, Daniel, Shing &amp; Marie</a:t>
+              <a:t>Mani, Brad, Daniel, Shing &amp; Marie.</a:t>
             </a:r>
           </a:p>
         </p:txBody>
@@ -8724,35 +8724,6 @@
           </a:p>
         </p:txBody>
       </p:sp>
-      <p:pic>
-        <p:nvPicPr>
-          <p:cNvPr id="12" name="Picture 11">
-            <a:extLst>
-              <a:ext uri="{FF2B5EF4-FFF2-40B4-BE49-F238E27FC236}">
-                <a16:creationId xmlns:a16="http://schemas.microsoft.com/office/drawing/2014/main" id="{8FAD867A-2549-4058-B44A-32D0A3F37BE1}"/>
-              </a:ext>
-            </a:extLst>
-          </p:cNvPr>
-          <p:cNvPicPr>
-            <a:picLocks noChangeAspect="1"/>
-          </p:cNvPicPr>
-          <p:nvPr/>
-        </p:nvPicPr>
-        <p:blipFill rotWithShape="1">
-          <a:blip r:embed="rId2"/>
-          <a:srcRect t="2589"/>
-          <a:stretch/>
-        </p:blipFill>
-        <p:spPr>
-          <a:xfrm>
-            <a:off x="2696486" y="731520"/>
-            <a:ext cx="6773332" cy="3134044"/>
-          </a:xfrm>
-          <a:prstGeom prst="rect">
-            <a:avLst/>
-          </a:prstGeom>
-        </p:spPr>
-      </p:pic>
       <p:sp>
         <p:nvSpPr>
           <p:cNvPr id="19" name="Rectangle 18">
@@ -8873,7 +8844,7 @@
           <a:p>
             <a:pPr algn="r"/>
             <a:r>
-              <a:rPr lang="en-AU" sz="3100" dirty="0">
+              <a:rPr lang="en-AU" sz="3100">
                 <a:solidFill>
                   <a:schemeClr val="tx1"/>
                 </a:solidFill>
@@ -8881,7 +8852,7 @@
               <a:t>DEMO OF APP’S FUNCTIONS</a:t>
             </a:r>
             <a:br>
-              <a:rPr lang="en-AU" sz="3100" dirty="0">
+              <a:rPr lang="en-AU" sz="3100">
                 <a:solidFill>
                   <a:schemeClr val="tx1"/>
                 </a:solidFill>
@@ -8976,9 +8947,9 @@
           <a:lstStyle/>
           <a:p>
             <a:r>
-              <a:rPr lang="en-AU" sz="2800" u="sng" dirty="0">
+              <a:rPr lang="en-AU" sz="2800" u="sng">
                 <a:latin typeface="+mj-lt"/>
-                <a:hlinkClick r:id="rId3">
+                <a:hlinkClick r:id="rId2">
                   <a:extLst>
                     <a:ext uri="{A12FA001-AC4F-418D-AE19-62706E023703}">
                       <ahyp:hlinkClr xmlns:ahyp="http://schemas.microsoft.com/office/drawing/2018/hyperlinkcolor" val="tx"/>
@@ -8988,7 +8959,7 @@
               </a:rPr>
               <a:t>https://daniel-brewer-stephenson.github.io/project1/</a:t>
             </a:r>
-            <a:endParaRPr lang="en-AU" sz="2800" u="sng" dirty="0">
+            <a:endParaRPr lang="en-AU" sz="2800" u="sng">
               <a:latin typeface="+mj-lt"/>
             </a:endParaRPr>
           </a:p>
@@ -8997,6 +8968,36 @@
           </a:p>
         </p:txBody>
       </p:sp>
+      <p:pic>
+        <p:nvPicPr>
+          <p:cNvPr id="8" name="Picture 7">
+            <a:extLst>
+              <a:ext uri="{FF2B5EF4-FFF2-40B4-BE49-F238E27FC236}">
+                <a16:creationId xmlns:a16="http://schemas.microsoft.com/office/drawing/2014/main" id="{8FADD850-3AE2-4054-A27F-BF3B74653045}"/>
+              </a:ext>
+            </a:extLst>
+          </p:cNvPr>
+          <p:cNvPicPr>
+            <a:picLocks noChangeAspect="1"/>
+          </p:cNvPicPr>
+          <p:nvPr/>
+        </p:nvPicPr>
+        <p:blipFill>
+          <a:blip r:embed="rId3"/>
+          <a:stretch>
+            <a:fillRect/>
+          </a:stretch>
+        </p:blipFill>
+        <p:spPr>
+          <a:xfrm>
+            <a:off x="2667000" y="648231"/>
+            <a:ext cx="6858000" cy="3266056"/>
+          </a:xfrm>
+          <a:prstGeom prst="rect">
+            <a:avLst/>
+          </a:prstGeom>
+        </p:spPr>
+      </p:pic>
     </p:spTree>
     <p:extLst>
       <p:ext uri="{BB962C8B-B14F-4D97-AF65-F5344CB8AC3E}">
@@ -9035,12 +9036,12 @@
           <a:chExt cx="0" cy="0"/>
         </a:xfrm>
       </p:grpSpPr>
-      <p:sp>
+      <p:sp useBgFill="1">
         <p:nvSpPr>
-          <p:cNvPr id="8" name="Rectangle 7">
+          <p:cNvPr id="36" name="Rectangle 14">
             <a:extLst>
               <a:ext uri="{FF2B5EF4-FFF2-40B4-BE49-F238E27FC236}">
-                <a16:creationId xmlns:a16="http://schemas.microsoft.com/office/drawing/2014/main" id="{70120F84-A866-4D9F-8B1C-9120A013D654}"/>
+                <a16:creationId xmlns:a16="http://schemas.microsoft.com/office/drawing/2014/main" id="{F04BED5A-E98E-4DA0-BAA5-4F6AB2492D6C}"/>
               </a:ext>
               <a:ext uri="{C183D7F6-B498-43B3-948B-1728B52AA6E4}">
                 <adec:decorative xmlns:adec="http://schemas.microsoft.com/office/drawing/2017/decorative" val="1"/>
@@ -9061,14 +9062,11 @@
         <p:spPr>
           <a:xfrm>
             <a:off x="0" y="0"/>
-            <a:ext cx="12192001" cy="6858000"/>
+            <a:ext cx="12192000" cy="6858000"/>
           </a:xfrm>
           <a:prstGeom prst="rect">
             <a:avLst/>
           </a:prstGeom>
-          <a:solidFill>
-            <a:schemeClr val="accent1"/>
-          </a:solidFill>
           <a:ln>
             <a:noFill/>
           </a:ln>
@@ -9090,119 +9088,20 @@
           </a:fontRef>
         </p:style>
         <p:txBody>
-          <a:bodyPr rot="0" spcFirstLastPara="0" vert="horz" wrap="square" lIns="91440" tIns="45720" rIns="91440" bIns="45720" numCol="1" spcCol="0" rtlCol="0" fromWordArt="0" anchor="ctr" anchorCtr="0" forceAA="0" compatLnSpc="1">
-            <a:prstTxWarp prst="textNoShape">
-              <a:avLst/>
-            </a:prstTxWarp>
-            <a:noAutofit/>
-          </a:bodyPr>
-          <a:lstStyle>
-            <a:defPPr>
-              <a:defRPr lang="en-US"/>
-            </a:defPPr>
-            <a:lvl1pPr marL="0" algn="l" defTabSz="914400" rtl="0" eaLnBrk="1" latinLnBrk="0" hangingPunct="1">
-              <a:defRPr sz="1800" kern="1200">
-                <a:solidFill>
-                  <a:schemeClr val="lt1"/>
-                </a:solidFill>
-                <a:latin typeface="+mn-lt"/>
-                <a:ea typeface="+mn-ea"/>
-                <a:cs typeface="+mn-cs"/>
-              </a:defRPr>
-            </a:lvl1pPr>
-            <a:lvl2pPr marL="457200" algn="l" defTabSz="914400" rtl="0" eaLnBrk="1" latinLnBrk="0" hangingPunct="1">
-              <a:defRPr sz="1800" kern="1200">
-                <a:solidFill>
-                  <a:schemeClr val="lt1"/>
-                </a:solidFill>
-                <a:latin typeface="+mn-lt"/>
-                <a:ea typeface="+mn-ea"/>
-                <a:cs typeface="+mn-cs"/>
-              </a:defRPr>
-            </a:lvl2pPr>
-            <a:lvl3pPr marL="914400" algn="l" defTabSz="914400" rtl="0" eaLnBrk="1" latinLnBrk="0" hangingPunct="1">
-              <a:defRPr sz="1800" kern="1200">
-                <a:solidFill>
-                  <a:schemeClr val="lt1"/>
-                </a:solidFill>
-                <a:latin typeface="+mn-lt"/>
-                <a:ea typeface="+mn-ea"/>
-                <a:cs typeface="+mn-cs"/>
-              </a:defRPr>
-            </a:lvl3pPr>
-            <a:lvl4pPr marL="1371600" algn="l" defTabSz="914400" rtl="0" eaLnBrk="1" latinLnBrk="0" hangingPunct="1">
-              <a:defRPr sz="1800" kern="1200">
-                <a:solidFill>
-                  <a:schemeClr val="lt1"/>
-                </a:solidFill>
-                <a:latin typeface="+mn-lt"/>
-                <a:ea typeface="+mn-ea"/>
-                <a:cs typeface="+mn-cs"/>
-              </a:defRPr>
-            </a:lvl4pPr>
-            <a:lvl5pPr marL="1828800" algn="l" defTabSz="914400" rtl="0" eaLnBrk="1" latinLnBrk="0" hangingPunct="1">
-              <a:defRPr sz="1800" kern="1200">
-                <a:solidFill>
-                  <a:schemeClr val="lt1"/>
-                </a:solidFill>
-                <a:latin typeface="+mn-lt"/>
-                <a:ea typeface="+mn-ea"/>
-                <a:cs typeface="+mn-cs"/>
-              </a:defRPr>
-            </a:lvl5pPr>
-            <a:lvl6pPr marL="2286000" algn="l" defTabSz="914400" rtl="0" eaLnBrk="1" latinLnBrk="0" hangingPunct="1">
-              <a:defRPr sz="1800" kern="1200">
-                <a:solidFill>
-                  <a:schemeClr val="lt1"/>
-                </a:solidFill>
-                <a:latin typeface="+mn-lt"/>
-                <a:ea typeface="+mn-ea"/>
-                <a:cs typeface="+mn-cs"/>
-              </a:defRPr>
-            </a:lvl6pPr>
-            <a:lvl7pPr marL="2743200" algn="l" defTabSz="914400" rtl="0" eaLnBrk="1" latinLnBrk="0" hangingPunct="1">
-              <a:defRPr sz="1800" kern="1200">
-                <a:solidFill>
-                  <a:schemeClr val="lt1"/>
-                </a:solidFill>
-                <a:latin typeface="+mn-lt"/>
-                <a:ea typeface="+mn-ea"/>
-                <a:cs typeface="+mn-cs"/>
-              </a:defRPr>
-            </a:lvl7pPr>
-            <a:lvl8pPr marL="3200400" algn="l" defTabSz="914400" rtl="0" eaLnBrk="1" latinLnBrk="0" hangingPunct="1">
-              <a:defRPr sz="1800" kern="1200">
-                <a:solidFill>
-                  <a:schemeClr val="lt1"/>
-                </a:solidFill>
-                <a:latin typeface="+mn-lt"/>
-                <a:ea typeface="+mn-ea"/>
-                <a:cs typeface="+mn-cs"/>
-              </a:defRPr>
-            </a:lvl8pPr>
-            <a:lvl9pPr marL="3657600" algn="l" defTabSz="914400" rtl="0" eaLnBrk="1" latinLnBrk="0" hangingPunct="1">
-              <a:defRPr sz="1800" kern="1200">
-                <a:solidFill>
-                  <a:schemeClr val="lt1"/>
-                </a:solidFill>
-                <a:latin typeface="+mn-lt"/>
-                <a:ea typeface="+mn-ea"/>
-                <a:cs typeface="+mn-cs"/>
-              </a:defRPr>
-            </a:lvl9pPr>
-          </a:lstStyle>
+          <a:bodyPr rtlCol="0" anchor="ctr"/>
+          <a:lstStyle/>
           <a:p>
             <a:pPr algn="ctr"/>
             <a:endParaRPr lang="en-US"/>
           </a:p>
         </p:txBody>
       </p:sp>
-      <p:sp useBgFill="1">
+      <p:sp>
         <p:nvSpPr>
-          <p:cNvPr id="10" name="Rectangle 9">
+          <p:cNvPr id="37" name="Rectangle 16">
             <a:extLst>
               <a:ext uri="{FF2B5EF4-FFF2-40B4-BE49-F238E27FC236}">
-                <a16:creationId xmlns:a16="http://schemas.microsoft.com/office/drawing/2014/main" id="{252FEFEF-6AC0-46B6-AC09-11FC56196FA4}"/>
+                <a16:creationId xmlns:a16="http://schemas.microsoft.com/office/drawing/2014/main" id="{EB64B94A-E40E-48CE-BD7B-C1A30AE572FB}"/>
               </a:ext>
               <a:ext uri="{C183D7F6-B498-43B3-948B-1728B52AA6E4}">
                 <adec:decorative xmlns:adec="http://schemas.microsoft.com/office/drawing/2017/decorative" val="1"/>
@@ -9222,19 +9121,133 @@
         </p:nvSpPr>
         <p:spPr>
           <a:xfrm>
-            <a:off x="210312" y="226665"/>
-            <a:ext cx="11722608" cy="6382512"/>
+            <a:off x="473982" y="488542"/>
+            <a:ext cx="11244036" cy="5880916"/>
           </a:xfrm>
           <a:prstGeom prst="rect">
             <a:avLst/>
           </a:prstGeom>
-          <a:ln w="6350" cap="flat" cmpd="sng" algn="ctr">
+          <a:ln w="15875">
             <a:noFill/>
+          </a:ln>
+        </p:spPr>
+        <p:style>
+          <a:lnRef idx="2">
+            <a:schemeClr val="accent1">
+              <a:shade val="50000"/>
+            </a:schemeClr>
+          </a:lnRef>
+          <a:fillRef idx="1">
+            <a:schemeClr val="accent1"/>
+          </a:fillRef>
+          <a:effectRef idx="0">
+            <a:schemeClr val="accent1"/>
+          </a:effectRef>
+          <a:fontRef idx="minor">
+            <a:schemeClr val="lt1"/>
+          </a:fontRef>
+        </p:style>
+        <p:txBody>
+          <a:bodyPr rtlCol="0" anchor="ctr"/>
+          <a:lstStyle/>
+          <a:p>
+            <a:pPr algn="ctr"/>
+            <a:endParaRPr lang="en-US"/>
+          </a:p>
+        </p:txBody>
+      </p:sp>
+      <p:cxnSp>
+        <p:nvCxnSpPr>
+          <p:cNvPr id="38" name="Straight Connector 18">
+            <a:extLst>
+              <a:ext uri="{FF2B5EF4-FFF2-40B4-BE49-F238E27FC236}">
+                <a16:creationId xmlns:a16="http://schemas.microsoft.com/office/drawing/2014/main" id="{49EC5CA6-6479-49D5-B4B5-5643D26B83CD}"/>
+              </a:ext>
+              <a:ext uri="{C183D7F6-B498-43B3-948B-1728B52AA6E4}">
+                <adec:decorative xmlns:adec="http://schemas.microsoft.com/office/drawing/2017/decorative" val="1"/>
+              </a:ext>
+            </a:extLst>
+          </p:cNvPr>
+          <p:cNvCxnSpPr>
+            <a:cxnSpLocks noGrp="1" noRot="1" noChangeAspect="1" noMove="1" noResize="1" noEditPoints="1" noAdjustHandles="1" noChangeArrowheads="1" noChangeShapeType="1"/>
+          </p:cNvCxnSpPr>
+          <p:nvPr>
+            <p:extLst>
+              <p:ext uri="{386F3935-93C4-4BCD-93E2-E3B085C9AB24}">
+                <p16:designElem xmlns:p16="http://schemas.microsoft.com/office/powerpoint/2015/main" val="1"/>
+              </p:ext>
+            </p:extLst>
+          </p:nvPr>
+        </p:nvCxnSpPr>
+        <p:spPr>
+          <a:xfrm>
+            <a:off x="4684442" y="2057401"/>
+            <a:ext cx="0" cy="2743200"/>
+          </a:xfrm>
+          <a:prstGeom prst="line">
+            <a:avLst/>
+          </a:prstGeom>
+          <a:ln w="15875">
+            <a:solidFill>
+              <a:srgbClr val="FFFFFF"/>
+            </a:solidFill>
+          </a:ln>
+        </p:spPr>
+        <p:style>
+          <a:lnRef idx="1">
+            <a:schemeClr val="accent1"/>
+          </a:lnRef>
+          <a:fillRef idx="0">
+            <a:schemeClr val="accent1"/>
+          </a:fillRef>
+          <a:effectRef idx="0">
+            <a:schemeClr val="accent1"/>
+          </a:effectRef>
+          <a:fontRef idx="minor">
+            <a:schemeClr val="tx1"/>
+          </a:fontRef>
+        </p:style>
+      </p:cxnSp>
+      <p:sp>
+        <p:nvSpPr>
+          <p:cNvPr id="39" name="Rectangle 20">
+            <a:extLst>
+              <a:ext uri="{FF2B5EF4-FFF2-40B4-BE49-F238E27FC236}">
+                <a16:creationId xmlns:a16="http://schemas.microsoft.com/office/drawing/2014/main" id="{D1B26337-5AA4-470D-9687-5907CB53BAE9}"/>
+              </a:ext>
+              <a:ext uri="{C183D7F6-B498-43B3-948B-1728B52AA6E4}">
+                <adec:decorative xmlns:adec="http://schemas.microsoft.com/office/drawing/2017/decorative" val="1"/>
+              </a:ext>
+            </a:extLst>
+          </p:cNvPr>
+          <p:cNvSpPr>
+            <a:spLocks noGrp="1" noRot="1" noChangeAspect="1" noMove="1" noResize="1" noEditPoints="1" noAdjustHandles="1" noChangeArrowheads="1" noChangeShapeType="1" noTextEdit="1"/>
+          </p:cNvSpPr>
+          <p:nvPr>
+            <p:extLst>
+              <p:ext uri="{386F3935-93C4-4BCD-93E2-E3B085C9AB24}">
+                <p16:designElem xmlns:p16="http://schemas.microsoft.com/office/powerpoint/2015/main" val="1"/>
+              </p:ext>
+            </p:extLst>
+          </p:nvPr>
+        </p:nvSpPr>
+        <p:spPr>
+          <a:xfrm>
+            <a:off x="669036" y="685800"/>
+            <a:ext cx="10853928" cy="5486400"/>
+          </a:xfrm>
+          <a:prstGeom prst="rect">
+            <a:avLst/>
+          </a:prstGeom>
+          <a:noFill/>
+          <a:ln w="6350" cap="sq" cmpd="sng" algn="ctr">
+            <a:solidFill>
+              <a:srgbClr val="FFFFFF"/>
+            </a:solidFill>
             <a:prstDash val="solid"/>
+            <a:miter lim="800000"/>
           </a:ln>
-          <a:effectLst>
-            <a:softEdge rad="0"/>
-          </a:effectLst>
+          <a:effectLst/>
         </p:spPr>
       </p:sp>
       <p:sp>
@@ -9255,8 +9268,8 @@
         </p:nvSpPr>
         <p:spPr>
           <a:xfrm>
-            <a:off x="1175512" y="870132"/>
-            <a:ext cx="9792208" cy="1527078"/>
+            <a:off x="866440" y="1000370"/>
+            <a:ext cx="3462079" cy="4857262"/>
           </a:xfrm>
         </p:spPr>
         <p:txBody>
@@ -9265,8 +9278,13 @@
           </a:bodyPr>
           <a:lstStyle/>
           <a:p>
+            <a:pPr algn="r"/>
             <a:r>
-              <a:rPr lang="en-AU" dirty="0"/>
+              <a:rPr lang="en-AU" sz="4400">
+                <a:solidFill>
+                  <a:srgbClr val="FFFFFF"/>
+                </a:solidFill>
+              </a:rPr>
               <a:t>Any Questions?</a:t>
             </a:r>
           </a:p>
@@ -9290,30 +9308,39 @@
         </p:nvSpPr>
         <p:spPr>
           <a:xfrm>
-            <a:off x="1175512" y="2557849"/>
-            <a:ext cx="9792208" cy="3407862"/>
+            <a:off x="4963691" y="1000370"/>
+            <a:ext cx="6212310" cy="4857262"/>
           </a:xfrm>
         </p:spPr>
         <p:txBody>
-          <a:bodyPr>
+          <a:bodyPr anchor="ctr">
             <a:normAutofit/>
           </a:bodyPr>
           <a:lstStyle/>
           <a:p>
             <a:r>
-              <a:rPr lang="en-AU" sz="2400" dirty="0">
+              <a:rPr lang="en-AU" sz="2000">
+                <a:solidFill>
+                  <a:srgbClr val="FFFFFF"/>
+                </a:solidFill>
                 <a:latin typeface="+mj-lt"/>
               </a:rPr>
               <a:t>Please ask after class, thx </a:t>
             </a:r>
             <a:r>
-              <a:rPr lang="en-AU" sz="2400" dirty="0">
+              <a:rPr lang="en-AU" sz="2000">
+                <a:solidFill>
+                  <a:srgbClr val="FFFFFF"/>
+                </a:solidFill>
                 <a:latin typeface="+mj-lt"/>
                 <a:sym typeface="Wingdings" panose="05000000000000000000" pitchFamily="2" charset="2"/>
               </a:rPr>
               <a:t></a:t>
             </a:r>
-            <a:endParaRPr lang="en-AU" sz="2400" dirty="0">
+            <a:endParaRPr lang="en-AU" sz="2000">
+              <a:solidFill>
+                <a:srgbClr val="FFFFFF"/>
+              </a:solidFill>
               <a:latin typeface="+mj-lt"/>
             </a:endParaRPr>
           </a:p>
@@ -9722,13 +9749,13 @@
         </p:nvSpPr>
         <p:spPr>
           <a:xfrm>
-            <a:off x="1175512" y="2397210"/>
-            <a:ext cx="9792208" cy="3568501"/>
+            <a:off x="1175512" y="2059806"/>
+            <a:ext cx="9792208" cy="3905905"/>
           </a:xfrm>
         </p:spPr>
         <p:txBody>
           <a:bodyPr>
-            <a:normAutofit/>
+            <a:normAutofit lnSpcReduction="10000"/>
           </a:bodyPr>
           <a:lstStyle/>
           <a:p>
@@ -9736,7 +9763,39 @@
               <a:rPr lang="en-AU" sz="3000" dirty="0">
                 <a:latin typeface="+mj-lt"/>
               </a:rPr>
-              <a:t>eatUP is designed to help any user figure out what they want to eat depending if they’re on the go or if they’ve decided to stay at home and cook.</a:t>
+              <a:t>eatUP is designed to help any user figure out what they want to eat in a matter of seconds. </a:t>
+            </a:r>
+            <a:br>
+              <a:rPr lang="en-AU" sz="3000" dirty="0">
+                <a:latin typeface="+mj-lt"/>
+              </a:rPr>
+            </a:br>
+            <a:endParaRPr lang="en-AU" sz="3000" dirty="0">
+              <a:latin typeface="+mj-lt"/>
+            </a:endParaRPr>
+          </a:p>
+          <a:p>
+            <a:r>
+              <a:rPr lang="en-AU" sz="3000" dirty="0">
+                <a:latin typeface="+mj-lt"/>
+              </a:rPr>
+              <a:t>The app provides different recipes and the user can pick which one they desire the most. </a:t>
+            </a:r>
+            <a:br>
+              <a:rPr lang="en-AU" sz="3000" dirty="0">
+                <a:latin typeface="+mj-lt"/>
+              </a:rPr>
+            </a:br>
+            <a:endParaRPr lang="en-AU" sz="3000" dirty="0">
+              <a:latin typeface="+mj-lt"/>
+            </a:endParaRPr>
+          </a:p>
+          <a:p>
+            <a:r>
+              <a:rPr lang="en-AU" sz="3000" dirty="0">
+                <a:latin typeface="+mj-lt"/>
+              </a:rPr>
+              <a:t>We also provide a nutritional table that can be beneficial to the user.</a:t>
             </a:r>
           </a:p>
         </p:txBody>
@@ -10044,7 +10103,7 @@
         </p:spPr>
         <p:txBody>
           <a:bodyPr>
-            <a:normAutofit fontScale="92500"/>
+            <a:normAutofit/>
           </a:bodyPr>
           <a:lstStyle/>
           <a:p>
@@ -10052,7 +10111,7 @@
               <a:rPr lang="en-AU" sz="2800" dirty="0">
                 <a:latin typeface="+mj-lt"/>
               </a:rPr>
-              <a:t>Everyone has a busy life schedule that they’re trying to keep up with and we’ve all experienced the same thing with the question of “What should we eat?” and usually are stumped for answers. </a:t>
+              <a:t>We’ve all experienced the same thing, with the question of “What should we eat?” and usually stumped for answers. </a:t>
             </a:r>
           </a:p>
           <a:p>
@@ -10068,7 +10127,7 @@
               <a:rPr lang="en-AU" sz="2800" dirty="0">
                 <a:latin typeface="+mj-lt"/>
               </a:rPr>
-              <a:t>So we wanted to make it easier for any user to pick their preferred meal or restaurant without having to spend a lot of time scrolling through google to figure it out. </a:t>
+              <a:t>So we wanted to make it easier for any user to pick their preferred meal without having to spend a lot of time scrolling through google to figure it out. </a:t>
             </a:r>
           </a:p>
         </p:txBody>
@@ -10376,7 +10435,7 @@
         </p:spPr>
         <p:txBody>
           <a:bodyPr>
-            <a:normAutofit fontScale="85000" lnSpcReduction="10000"/>
+            <a:normAutofit fontScale="92500" lnSpcReduction="20000"/>
           </a:bodyPr>
           <a:lstStyle/>
           <a:p>
@@ -10384,7 +10443,20 @@
               <a:rPr lang="en-AU" sz="2400" dirty="0">
                 <a:latin typeface="+mj-lt"/>
               </a:rPr>
-              <a:t>Deciding whether you want a recipe or restaurant.</a:t>
+              <a:t>Choosing the recipe option.</a:t>
+            </a:r>
+          </a:p>
+          <a:p>
+            <a:endParaRPr lang="en-AU" sz="2400" dirty="0">
+              <a:latin typeface="+mj-lt"/>
+            </a:endParaRPr>
+          </a:p>
+          <a:p>
+            <a:r>
+              <a:rPr lang="en-AU" sz="2400" dirty="0">
+                <a:latin typeface="+mj-lt"/>
+              </a:rPr>
+              <a:t>4 different recipes will be shown.</a:t>
             </a:r>
             <a:br>
               <a:rPr lang="en-AU" sz="2400" dirty="0">
@@ -10400,7 +10472,7 @@
               <a:rPr lang="en-AU" sz="2400" dirty="0">
                 <a:latin typeface="+mj-lt"/>
               </a:rPr>
-              <a:t>4 Options of the preferred choice </a:t>
+              <a:t>Once the user has picked a recipe, 3 new choices will show up.</a:t>
             </a:r>
             <a:br>
               <a:rPr lang="en-AU" sz="2400" dirty="0">
@@ -10416,23 +10488,7 @@
               <a:rPr lang="en-AU" sz="2400" dirty="0">
                 <a:latin typeface="+mj-lt"/>
               </a:rPr>
-              <a:t> When the user decides on the desired choice, 3 new choices will show up keeping the first choice there.</a:t>
-            </a:r>
-            <a:br>
-              <a:rPr lang="en-AU" sz="2400" dirty="0">
-                <a:latin typeface="+mj-lt"/>
-              </a:rPr>
-            </a:br>
-            <a:endParaRPr lang="en-AU" sz="2400" dirty="0">
-              <a:latin typeface="+mj-lt"/>
-            </a:endParaRPr>
-          </a:p>
-          <a:p>
-            <a:r>
-              <a:rPr lang="en-AU" sz="2400" dirty="0">
-                <a:latin typeface="+mj-lt"/>
-              </a:rPr>
-              <a:t>Whatever the user decides as their final decision will show up after it has been clicked, this will either show the recipe steps or restaurant choices. </a:t>
+              <a:t>Whatever the user decides as their final decision, this will be shown at the end, with the recipes nutritional info with the click of a button.</a:t>
             </a:r>
             <a:br>
               <a:rPr lang="en-AU" sz="2400" dirty="0">
@@ -11054,52 +11110,6 @@
       </p:sp>
       <p:pic>
         <p:nvPicPr>
-          <p:cNvPr id="1026" name="Picture 2" descr="Image result for food 2 fork">
-            <a:extLst>
-              <a:ext uri="{FF2B5EF4-FFF2-40B4-BE49-F238E27FC236}">
-                <a16:creationId xmlns:a16="http://schemas.microsoft.com/office/drawing/2014/main" id="{0B8B07D0-F335-4702-A311-613FF4B2598A}"/>
-              </a:ext>
-            </a:extLst>
-          </p:cNvPr>
-          <p:cNvPicPr>
-            <a:picLocks noChangeAspect="1" noChangeArrowheads="1"/>
-          </p:cNvPicPr>
-          <p:nvPr/>
-        </p:nvPicPr>
-        <p:blipFill>
-          <a:blip r:embed="rId2">
-            <a:extLst>
-              <a:ext uri="{28A0092B-C50C-407E-A947-70E740481C1C}">
-                <a14:useLocalDpi xmlns:a14="http://schemas.microsoft.com/office/drawing/2010/main" val="0"/>
-              </a:ext>
-            </a:extLst>
-          </a:blip>
-          <a:stretch>
-            <a:fillRect/>
-          </a:stretch>
-        </p:blipFill>
-        <p:spPr bwMode="auto">
-          <a:xfrm>
-            <a:off x="6237684" y="540784"/>
-            <a:ext cx="5377064" cy="1379456"/>
-          </a:xfrm>
-          <a:prstGeom prst="rect">
-            <a:avLst/>
-          </a:prstGeom>
-          <a:noFill/>
-          <a:extLst>
-            <a:ext uri="{909E8E84-426E-40DD-AFC4-6F175D3DCCD1}">
-              <a14:hiddenFill xmlns:a14="http://schemas.microsoft.com/office/drawing/2010/main">
-                <a:solidFill>
-                  <a:srgbClr val="FFFFFF"/>
-                </a:solidFill>
-              </a14:hiddenFill>
-            </a:ext>
-          </a:extLst>
-        </p:spPr>
-      </p:pic>
-      <p:pic>
-        <p:nvPicPr>
           <p:cNvPr id="1028" name="Picture 4" descr="Image result for zomato logo">
             <a:extLst>
               <a:ext uri="{FF2B5EF4-FFF2-40B4-BE49-F238E27FC236}">
@@ -11113,7 +11123,7 @@
           <p:nvPr/>
         </p:nvPicPr>
         <p:blipFill>
-          <a:blip r:embed="rId3">
+          <a:blip r:embed="rId2">
             <a:extLst>
               <a:ext uri="{28A0092B-C50C-407E-A947-70E740481C1C}">
                 <a14:useLocalDpi xmlns:a14="http://schemas.microsoft.com/office/drawing/2010/main" val="0"/>
@@ -11184,11 +11194,68 @@
               <a:rPr lang="en-AU" sz="2400" dirty="0">
                 <a:latin typeface="+mj-lt"/>
               </a:rPr>
-              <a:t>Zomato for Restaurants.</a:t>
+              <a:t>Edamam for the nutritional information.</a:t>
             </a:r>
           </a:p>
         </p:txBody>
       </p:sp>
+      <p:pic>
+        <p:nvPicPr>
+          <p:cNvPr id="3" name="Picture 2" descr="Image result for edamam api">
+            <a:extLst>
+              <a:ext uri="{FF2B5EF4-FFF2-40B4-BE49-F238E27FC236}">
+                <a16:creationId xmlns:a16="http://schemas.microsoft.com/office/drawing/2014/main" id="{4E23212E-CEBB-428F-85D0-BB9C8CAC3A0C}"/>
+              </a:ext>
+            </a:extLst>
+          </p:cNvPr>
+          <p:cNvPicPr>
+            <a:picLocks noChangeAspect="1" noChangeArrowheads="1"/>
+          </p:cNvPicPr>
+          <p:nvPr/>
+        </p:nvPicPr>
+        <p:blipFill>
+          <a:blip r:embed="rId3">
+            <a:clrChange>
+              <a:clrFrom>
+                <a:srgbClr val="FFFFFF"/>
+              </a:clrFrom>
+              <a:clrTo>
+                <a:srgbClr val="FFFFFF">
+                  <a:alpha val="0"/>
+                </a:srgbClr>
+              </a:clrTo>
+            </a:clrChange>
+            <a:extLst>
+              <a:ext uri="{28A0092B-C50C-407E-A947-70E740481C1C}">
+                <a14:useLocalDpi xmlns:a14="http://schemas.microsoft.com/office/drawing/2010/main" val="0"/>
+              </a:ext>
+            </a:extLst>
+          </a:blip>
+          <a:srcRect/>
+          <a:stretch>
+            <a:fillRect/>
+          </a:stretch>
+        </p:blipFill>
+        <p:spPr bwMode="auto">
+          <a:xfrm>
+            <a:off x="6198668" y="663712"/>
+            <a:ext cx="5306155" cy="1295448"/>
+          </a:xfrm>
+          <a:prstGeom prst="rect">
+            <a:avLst/>
+          </a:prstGeom>
+          <a:noFill/>
+          <a:extLst>
+            <a:ext uri="{909E8E84-426E-40DD-AFC4-6F175D3DCCD1}">
+              <a14:hiddenFill xmlns:a14="http://schemas.microsoft.com/office/drawing/2010/main">
+                <a:solidFill>
+                  <a:srgbClr val="FFFFFF"/>
+                </a:solidFill>
+              </a14:hiddenFill>
+            </a:ext>
+          </a:extLst>
+        </p:spPr>
+      </p:pic>
     </p:spTree>
     <p:extLst>
       <p:ext uri="{BB962C8B-B14F-4D97-AF65-F5344CB8AC3E}">

</xml_diff>

<commit_message>
updated readme, fonts/margins and the powerpoint
</commit_message>
<xml_diff>
--- a/assets/powerpoint/eatUP Powerpoint.pptx
+++ b/assets/powerpoint/eatUP Powerpoint.pptx
@@ -10922,7 +10922,7 @@
       </p:grpSpPr>
       <p:sp useBgFill="1">
         <p:nvSpPr>
-          <p:cNvPr id="77" name="Rectangle 76">
+          <p:cNvPr id="141" name="Rectangle 140">
             <a:extLst>
               <a:ext uri="{FF2B5EF4-FFF2-40B4-BE49-F238E27FC236}">
                 <a16:creationId xmlns:a16="http://schemas.microsoft.com/office/drawing/2014/main" id="{26C4D022-E2BC-435F-9CDB-44DC57C0701C}"/>
@@ -10982,7 +10982,7 @@
       </p:sp>
       <p:sp>
         <p:nvSpPr>
-          <p:cNvPr id="79" name="Rectangle 78">
+          <p:cNvPr id="143" name="Rectangle 142">
             <a:extLst>
               <a:ext uri="{FF2B5EF4-FFF2-40B4-BE49-F238E27FC236}">
                 <a16:creationId xmlns:a16="http://schemas.microsoft.com/office/drawing/2014/main" id="{C926CAD6-45B1-4A85-A196-E722067B1D21}"/>
@@ -11027,7 +11027,7 @@
       </p:sp>
       <p:sp>
         <p:nvSpPr>
-          <p:cNvPr id="81" name="Rectangle 80">
+          <p:cNvPr id="145" name="Rectangle 144">
             <a:extLst>
               <a:ext uri="{FF2B5EF4-FFF2-40B4-BE49-F238E27FC236}">
                 <a16:creationId xmlns:a16="http://schemas.microsoft.com/office/drawing/2014/main" id="{0E0936D5-2DCE-48A4-93BC-BA7861B4E343}"/>
@@ -11087,8 +11087,8 @@
         </p:nvSpPr>
         <p:spPr>
           <a:xfrm>
-            <a:off x="577252" y="307984"/>
-            <a:ext cx="4877123" cy="1371600"/>
+            <a:off x="6303580" y="642594"/>
+            <a:ext cx="5245269" cy="1371600"/>
           </a:xfrm>
         </p:spPr>
         <p:txBody>
@@ -11098,9 +11098,9 @@
           <a:lstStyle/>
           <a:p>
             <a:r>
-              <a:rPr lang="en-AU" sz="4000" dirty="0">
+              <a:rPr lang="en-AU" sz="4000">
                 <a:solidFill>
-                  <a:schemeClr val="tx1"/>
+                  <a:schemeClr val="bg1"/>
                 </a:solidFill>
               </a:rPr>
               <a:t>API’S USED</a:t>
@@ -11110,10 +11110,10 @@
       </p:sp>
       <p:pic>
         <p:nvPicPr>
-          <p:cNvPr id="1028" name="Picture 4" descr="Image result for zomato logo">
+          <p:cNvPr id="3" name="Picture 2" descr="Image result for edamam api">
             <a:extLst>
               <a:ext uri="{FF2B5EF4-FFF2-40B4-BE49-F238E27FC236}">
-                <a16:creationId xmlns:a16="http://schemas.microsoft.com/office/drawing/2014/main" id="{F7763076-A755-4A87-B07C-5034A118919E}"/>
+                <a16:creationId xmlns:a16="http://schemas.microsoft.com/office/drawing/2014/main" id="{4E23212E-CEBB-428F-85D0-BB9C8CAC3A0C}"/>
               </a:ext>
             </a:extLst>
           </p:cNvPr>
@@ -11136,8 +11136,54 @@
         </p:blipFill>
         <p:spPr bwMode="auto">
           <a:xfrm>
-            <a:off x="7276444" y="2302832"/>
-            <a:ext cx="3665876" cy="3665876"/>
+            <a:off x="643467" y="1419301"/>
+            <a:ext cx="4379592" cy="1073000"/>
+          </a:xfrm>
+          <a:prstGeom prst="rect">
+            <a:avLst/>
+          </a:prstGeom>
+          <a:noFill/>
+          <a:extLst>
+            <a:ext uri="{909E8E84-426E-40DD-AFC4-6F175D3DCCD1}">
+              <a14:hiddenFill xmlns:a14="http://schemas.microsoft.com/office/drawing/2010/main">
+                <a:solidFill>
+                  <a:srgbClr val="FFFFFF"/>
+                </a:solidFill>
+              </a14:hiddenFill>
+            </a:ext>
+          </a:extLst>
+        </p:spPr>
+      </p:pic>
+      <p:pic>
+        <p:nvPicPr>
+          <p:cNvPr id="1032" name="Picture 8" descr="Image result for food 2 fork">
+            <a:extLst>
+              <a:ext uri="{FF2B5EF4-FFF2-40B4-BE49-F238E27FC236}">
+                <a16:creationId xmlns:a16="http://schemas.microsoft.com/office/drawing/2014/main" id="{E3711A01-D5B1-4C71-8C9A-3AF3E03BF1C7}"/>
+              </a:ext>
+            </a:extLst>
+          </p:cNvPr>
+          <p:cNvPicPr>
+            <a:picLocks noChangeAspect="1" noChangeArrowheads="1"/>
+          </p:cNvPicPr>
+          <p:nvPr/>
+        </p:nvPicPr>
+        <p:blipFill>
+          <a:blip r:embed="rId3">
+            <a:extLst>
+              <a:ext uri="{28A0092B-C50C-407E-A947-70E740481C1C}">
+                <a14:useLocalDpi xmlns:a14="http://schemas.microsoft.com/office/drawing/2010/main" val="0"/>
+              </a:ext>
+            </a:extLst>
+          </a:blip>
+          <a:stretch>
+            <a:fillRect/>
+          </a:stretch>
+        </p:blipFill>
+        <p:spPr bwMode="auto">
+          <a:xfrm>
+            <a:off x="643463" y="4341751"/>
+            <a:ext cx="4369190" cy="1120891"/>
           </a:xfrm>
           <a:prstGeom prst="rect">
             <a:avLst/>
@@ -11172,8 +11218,8 @@
         </p:nvSpPr>
         <p:spPr>
           <a:xfrm>
-            <a:off x="577252" y="1679584"/>
-            <a:ext cx="4877123" cy="4555168"/>
+            <a:off x="6303580" y="2103120"/>
+            <a:ext cx="5245269" cy="3931920"/>
           </a:xfrm>
         </p:spPr>
         <p:txBody>
@@ -11183,7 +11229,10 @@
           <a:lstStyle/>
           <a:p>
             <a:r>
-              <a:rPr lang="en-AU" sz="2400" dirty="0">
+              <a:rPr lang="en-AU">
+                <a:solidFill>
+                  <a:schemeClr val="bg1"/>
+                </a:solidFill>
                 <a:latin typeface="+mj-lt"/>
               </a:rPr>
               <a:t>We used the Food2Fork for recipes…</a:t>
@@ -11191,7 +11240,10 @@
           </a:p>
           <a:p>
             <a:r>
-              <a:rPr lang="en-AU" sz="2400" dirty="0">
+              <a:rPr lang="en-AU">
+                <a:solidFill>
+                  <a:schemeClr val="bg1"/>
+                </a:solidFill>
                 <a:latin typeface="+mj-lt"/>
               </a:rPr>
               <a:t>Edamam for the nutritional information.</a:t>
@@ -11199,63 +11251,6 @@
           </a:p>
         </p:txBody>
       </p:sp>
-      <p:pic>
-        <p:nvPicPr>
-          <p:cNvPr id="3" name="Picture 2" descr="Image result for edamam api">
-            <a:extLst>
-              <a:ext uri="{FF2B5EF4-FFF2-40B4-BE49-F238E27FC236}">
-                <a16:creationId xmlns:a16="http://schemas.microsoft.com/office/drawing/2014/main" id="{4E23212E-CEBB-428F-85D0-BB9C8CAC3A0C}"/>
-              </a:ext>
-            </a:extLst>
-          </p:cNvPr>
-          <p:cNvPicPr>
-            <a:picLocks noChangeAspect="1" noChangeArrowheads="1"/>
-          </p:cNvPicPr>
-          <p:nvPr/>
-        </p:nvPicPr>
-        <p:blipFill>
-          <a:blip r:embed="rId3">
-            <a:clrChange>
-              <a:clrFrom>
-                <a:srgbClr val="FFFFFF"/>
-              </a:clrFrom>
-              <a:clrTo>
-                <a:srgbClr val="FFFFFF">
-                  <a:alpha val="0"/>
-                </a:srgbClr>
-              </a:clrTo>
-            </a:clrChange>
-            <a:extLst>
-              <a:ext uri="{28A0092B-C50C-407E-A947-70E740481C1C}">
-                <a14:useLocalDpi xmlns:a14="http://schemas.microsoft.com/office/drawing/2010/main" val="0"/>
-              </a:ext>
-            </a:extLst>
-          </a:blip>
-          <a:srcRect/>
-          <a:stretch>
-            <a:fillRect/>
-          </a:stretch>
-        </p:blipFill>
-        <p:spPr bwMode="auto">
-          <a:xfrm>
-            <a:off x="6198668" y="663712"/>
-            <a:ext cx="5306155" cy="1295448"/>
-          </a:xfrm>
-          <a:prstGeom prst="rect">
-            <a:avLst/>
-          </a:prstGeom>
-          <a:noFill/>
-          <a:extLst>
-            <a:ext uri="{909E8E84-426E-40DD-AFC4-6F175D3DCCD1}">
-              <a14:hiddenFill xmlns:a14="http://schemas.microsoft.com/office/drawing/2010/main">
-                <a:solidFill>
-                  <a:srgbClr val="FFFFFF"/>
-                </a:solidFill>
-              </a14:hiddenFill>
-            </a:ext>
-          </a:extLst>
-        </p:spPr>
-      </p:pic>
     </p:spTree>
     <p:extLst>
       <p:ext uri="{BB962C8B-B14F-4D97-AF65-F5344CB8AC3E}">

</xml_diff>